<commit_message>
readme and presentation fixes
</commit_message>
<xml_diff>
--- a/Kubernetes API Extensions.pptx
+++ b/Kubernetes API Extensions.pptx
@@ -5,10 +5,10 @@
     <p:sldMasterId id="2147483749" r:id="rId4"/>
   </p:sldMasterIdLst>
   <p:notesMasterIdLst>
-    <p:notesMasterId r:id="rId13"/>
+    <p:notesMasterId r:id="rId18"/>
   </p:notesMasterIdLst>
   <p:handoutMasterIdLst>
-    <p:handoutMasterId r:id="rId14"/>
+    <p:handoutMasterId r:id="rId19"/>
   </p:handoutMasterIdLst>
   <p:sldIdLst>
     <p:sldId id="256" r:id="rId5"/>
@@ -17,8 +17,13 @@
     <p:sldId id="341" r:id="rId8"/>
     <p:sldId id="342" r:id="rId9"/>
     <p:sldId id="343" r:id="rId10"/>
-    <p:sldId id="339" r:id="rId11"/>
-    <p:sldId id="344" r:id="rId12"/>
+    <p:sldId id="345" r:id="rId11"/>
+    <p:sldId id="339" r:id="rId12"/>
+    <p:sldId id="346" r:id="rId13"/>
+    <p:sldId id="347" r:id="rId14"/>
+    <p:sldId id="349" r:id="rId15"/>
+    <p:sldId id="348" r:id="rId16"/>
+    <p:sldId id="344" r:id="rId17"/>
   </p:sldIdLst>
   <p:sldSz cx="9144000" cy="5143500" type="screen16x9"/>
   <p:notesSz cx="6858000" cy="9144000"/>
@@ -240,7 +245,7 @@
           <a:p>
             <a:fld id="{E0E49B37-B3CF-48A3-B172-7B77541BFFBD}" type="datetimeFigureOut">
               <a:rPr lang="de-DE" smtClean="0"/>
-              <a:t>07.07.24</a:t>
+              <a:t>09.07.24</a:t>
             </a:fld>
             <a:endParaRPr lang="de-DE"/>
           </a:p>
@@ -417,7 +422,7 @@
           <a:p>
             <a:fld id="{A3C54D81-05C3-7140-80BE-EDE0A1F8F28E}" type="datetimeFigureOut">
               <a:rPr lang="en-US" smtClean="0"/>
-              <a:t>7/7/24</a:t>
+              <a:t>7/9/24</a:t>
             </a:fld>
             <a:endParaRPr lang="en-US"/>
           </a:p>
@@ -768,6 +773,250 @@
 </p:notes>
 </file>
 
+<file path=ppt/notesSlides/notesSlide10.xml><?xml version="1.0" encoding="utf-8"?>
+<p:notes xmlns:a="http://schemas.openxmlformats.org/drawingml/2006/main" xmlns:r="http://schemas.openxmlformats.org/officeDocument/2006/relationships" xmlns:p="http://schemas.openxmlformats.org/presentationml/2006/main">
+  <p:cSld>
+    <p:spTree>
+      <p:nvGrpSpPr>
+        <p:cNvPr id="1" name=""/>
+        <p:cNvGrpSpPr/>
+        <p:nvPr/>
+      </p:nvGrpSpPr>
+      <p:grpSpPr>
+        <a:xfrm>
+          <a:off x="0" y="0"/>
+          <a:ext cx="0" cy="0"/>
+          <a:chOff x="0" y="0"/>
+          <a:chExt cx="0" cy="0"/>
+        </a:xfrm>
+      </p:grpSpPr>
+      <p:sp>
+        <p:nvSpPr>
+          <p:cNvPr id="2" name="Slide Image Placeholder 1"/>
+          <p:cNvSpPr>
+            <a:spLocks noGrp="1" noRot="1" noChangeAspect="1"/>
+          </p:cNvSpPr>
+          <p:nvPr>
+            <p:ph type="sldImg"/>
+          </p:nvPr>
+        </p:nvSpPr>
+        <p:spPr/>
+      </p:sp>
+      <p:sp>
+        <p:nvSpPr>
+          <p:cNvPr id="3" name="Notes Placeholder 2"/>
+          <p:cNvSpPr>
+            <a:spLocks noGrp="1"/>
+          </p:cNvSpPr>
+          <p:nvPr>
+            <p:ph type="body" idx="1"/>
+          </p:nvPr>
+        </p:nvSpPr>
+        <p:spPr/>
+        <p:txBody>
+          <a:bodyPr/>
+          <a:lstStyle/>
+          <a:p>
+            <a:endParaRPr lang="de-DE" dirty="0"/>
+          </a:p>
+        </p:txBody>
+      </p:sp>
+    </p:spTree>
+    <p:extLst>
+      <p:ext uri="{BB962C8B-B14F-4D97-AF65-F5344CB8AC3E}">
+        <p14:creationId xmlns:p14="http://schemas.microsoft.com/office/powerpoint/2010/main" val="531612210"/>
+      </p:ext>
+    </p:extLst>
+  </p:cSld>
+  <p:clrMapOvr>
+    <a:masterClrMapping/>
+  </p:clrMapOvr>
+</p:notes>
+</file>
+
+<file path=ppt/notesSlides/notesSlide11.xml><?xml version="1.0" encoding="utf-8"?>
+<p:notes xmlns:a="http://schemas.openxmlformats.org/drawingml/2006/main" xmlns:r="http://schemas.openxmlformats.org/officeDocument/2006/relationships" xmlns:p="http://schemas.openxmlformats.org/presentationml/2006/main">
+  <p:cSld>
+    <p:spTree>
+      <p:nvGrpSpPr>
+        <p:cNvPr id="1" name=""/>
+        <p:cNvGrpSpPr/>
+        <p:nvPr/>
+      </p:nvGrpSpPr>
+      <p:grpSpPr>
+        <a:xfrm>
+          <a:off x="0" y="0"/>
+          <a:ext cx="0" cy="0"/>
+          <a:chOff x="0" y="0"/>
+          <a:chExt cx="0" cy="0"/>
+        </a:xfrm>
+      </p:grpSpPr>
+      <p:sp>
+        <p:nvSpPr>
+          <p:cNvPr id="2" name="Slide Image Placeholder 1"/>
+          <p:cNvSpPr>
+            <a:spLocks noGrp="1" noRot="1" noChangeAspect="1"/>
+          </p:cNvSpPr>
+          <p:nvPr>
+            <p:ph type="sldImg"/>
+          </p:nvPr>
+        </p:nvSpPr>
+        <p:spPr/>
+      </p:sp>
+      <p:sp>
+        <p:nvSpPr>
+          <p:cNvPr id="3" name="Notes Placeholder 2"/>
+          <p:cNvSpPr>
+            <a:spLocks noGrp="1"/>
+          </p:cNvSpPr>
+          <p:nvPr>
+            <p:ph type="body" idx="1"/>
+          </p:nvPr>
+        </p:nvSpPr>
+        <p:spPr/>
+        <p:txBody>
+          <a:bodyPr/>
+          <a:lstStyle/>
+          <a:p>
+            <a:endParaRPr lang="de-DE" dirty="0"/>
+          </a:p>
+        </p:txBody>
+      </p:sp>
+    </p:spTree>
+    <p:extLst>
+      <p:ext uri="{BB962C8B-B14F-4D97-AF65-F5344CB8AC3E}">
+        <p14:creationId xmlns:p14="http://schemas.microsoft.com/office/powerpoint/2010/main" val="1600213829"/>
+      </p:ext>
+    </p:extLst>
+  </p:cSld>
+  <p:clrMapOvr>
+    <a:masterClrMapping/>
+  </p:clrMapOvr>
+</p:notes>
+</file>
+
+<file path=ppt/notesSlides/notesSlide12.xml><?xml version="1.0" encoding="utf-8"?>
+<p:notes xmlns:a="http://schemas.openxmlformats.org/drawingml/2006/main" xmlns:r="http://schemas.openxmlformats.org/officeDocument/2006/relationships" xmlns:p="http://schemas.openxmlformats.org/presentationml/2006/main">
+  <p:cSld>
+    <p:spTree>
+      <p:nvGrpSpPr>
+        <p:cNvPr id="1" name=""/>
+        <p:cNvGrpSpPr/>
+        <p:nvPr/>
+      </p:nvGrpSpPr>
+      <p:grpSpPr>
+        <a:xfrm>
+          <a:off x="0" y="0"/>
+          <a:ext cx="0" cy="0"/>
+          <a:chOff x="0" y="0"/>
+          <a:chExt cx="0" cy="0"/>
+        </a:xfrm>
+      </p:grpSpPr>
+      <p:sp>
+        <p:nvSpPr>
+          <p:cNvPr id="2" name="Slide Image Placeholder 1"/>
+          <p:cNvSpPr>
+            <a:spLocks noGrp="1" noRot="1" noChangeAspect="1"/>
+          </p:cNvSpPr>
+          <p:nvPr>
+            <p:ph type="sldImg"/>
+          </p:nvPr>
+        </p:nvSpPr>
+        <p:spPr/>
+      </p:sp>
+      <p:sp>
+        <p:nvSpPr>
+          <p:cNvPr id="3" name="Notes Placeholder 2"/>
+          <p:cNvSpPr>
+            <a:spLocks noGrp="1"/>
+          </p:cNvSpPr>
+          <p:nvPr>
+            <p:ph type="body" idx="1"/>
+          </p:nvPr>
+        </p:nvSpPr>
+        <p:spPr/>
+        <p:txBody>
+          <a:bodyPr/>
+          <a:lstStyle/>
+          <a:p>
+            <a:endParaRPr lang="de-DE" dirty="0"/>
+          </a:p>
+        </p:txBody>
+      </p:sp>
+    </p:spTree>
+    <p:extLst>
+      <p:ext uri="{BB962C8B-B14F-4D97-AF65-F5344CB8AC3E}">
+        <p14:creationId xmlns:p14="http://schemas.microsoft.com/office/powerpoint/2010/main" val="56817107"/>
+      </p:ext>
+    </p:extLst>
+  </p:cSld>
+  <p:clrMapOvr>
+    <a:masterClrMapping/>
+  </p:clrMapOvr>
+</p:notes>
+</file>
+
+<file path=ppt/notesSlides/notesSlide13.xml><?xml version="1.0" encoding="utf-8"?>
+<p:notes xmlns:a="http://schemas.openxmlformats.org/drawingml/2006/main" xmlns:r="http://schemas.openxmlformats.org/officeDocument/2006/relationships" xmlns:p="http://schemas.openxmlformats.org/presentationml/2006/main">
+  <p:cSld>
+    <p:spTree>
+      <p:nvGrpSpPr>
+        <p:cNvPr id="1" name=""/>
+        <p:cNvGrpSpPr/>
+        <p:nvPr/>
+      </p:nvGrpSpPr>
+      <p:grpSpPr>
+        <a:xfrm>
+          <a:off x="0" y="0"/>
+          <a:ext cx="0" cy="0"/>
+          <a:chOff x="0" y="0"/>
+          <a:chExt cx="0" cy="0"/>
+        </a:xfrm>
+      </p:grpSpPr>
+      <p:sp>
+        <p:nvSpPr>
+          <p:cNvPr id="2" name="Slide Image Placeholder 1"/>
+          <p:cNvSpPr>
+            <a:spLocks noGrp="1" noRot="1" noChangeAspect="1"/>
+          </p:cNvSpPr>
+          <p:nvPr>
+            <p:ph type="sldImg"/>
+          </p:nvPr>
+        </p:nvSpPr>
+        <p:spPr/>
+      </p:sp>
+      <p:sp>
+        <p:nvSpPr>
+          <p:cNvPr id="3" name="Notes Placeholder 2"/>
+          <p:cNvSpPr>
+            <a:spLocks noGrp="1"/>
+          </p:cNvSpPr>
+          <p:nvPr>
+            <p:ph type="body" idx="1"/>
+          </p:nvPr>
+        </p:nvSpPr>
+        <p:spPr/>
+        <p:txBody>
+          <a:bodyPr/>
+          <a:lstStyle/>
+          <a:p>
+            <a:endParaRPr lang="de-DE"/>
+          </a:p>
+        </p:txBody>
+      </p:sp>
+    </p:spTree>
+    <p:extLst>
+      <p:ext uri="{BB962C8B-B14F-4D97-AF65-F5344CB8AC3E}">
+        <p14:creationId xmlns:p14="http://schemas.microsoft.com/office/powerpoint/2010/main" val="1300237050"/>
+      </p:ext>
+    </p:extLst>
+  </p:cSld>
+  <p:clrMapOvr>
+    <a:masterClrMapping/>
+  </p:clrMapOvr>
+</p:notes>
+</file>
+
 <file path=ppt/notesSlides/notesSlide2.xml><?xml version="1.0" encoding="utf-8"?>
 <p:notes xmlns:a="http://schemas.openxmlformats.org/drawingml/2006/main" xmlns:r="http://schemas.openxmlformats.org/officeDocument/2006/relationships" xmlns:p="http://schemas.openxmlformats.org/presentationml/2006/main">
   <p:cSld>
@@ -1117,14 +1366,14 @@
           <a:bodyPr/>
           <a:lstStyle/>
           <a:p>
-            <a:endParaRPr lang="de-DE"/>
+            <a:endParaRPr lang="de-DE" dirty="0"/>
           </a:p>
         </p:txBody>
       </p:sp>
     </p:spTree>
     <p:extLst>
       <p:ext uri="{BB962C8B-B14F-4D97-AF65-F5344CB8AC3E}">
-        <p14:creationId xmlns:p14="http://schemas.microsoft.com/office/powerpoint/2010/main" val="3611243758"/>
+        <p14:creationId xmlns:p14="http://schemas.microsoft.com/office/powerpoint/2010/main" val="3547103475"/>
       </p:ext>
     </p:extLst>
   </p:cSld>
@@ -1185,7 +1434,68 @@
     </p:spTree>
     <p:extLst>
       <p:ext uri="{BB962C8B-B14F-4D97-AF65-F5344CB8AC3E}">
-        <p14:creationId xmlns:p14="http://schemas.microsoft.com/office/powerpoint/2010/main" val="1300237050"/>
+        <p14:creationId xmlns:p14="http://schemas.microsoft.com/office/powerpoint/2010/main" val="3611243758"/>
+      </p:ext>
+    </p:extLst>
+  </p:cSld>
+  <p:clrMapOvr>
+    <a:masterClrMapping/>
+  </p:clrMapOvr>
+</p:notes>
+</file>
+
+<file path=ppt/notesSlides/notesSlide9.xml><?xml version="1.0" encoding="utf-8"?>
+<p:notes xmlns:a="http://schemas.openxmlformats.org/drawingml/2006/main" xmlns:r="http://schemas.openxmlformats.org/officeDocument/2006/relationships" xmlns:p="http://schemas.openxmlformats.org/presentationml/2006/main">
+  <p:cSld>
+    <p:spTree>
+      <p:nvGrpSpPr>
+        <p:cNvPr id="1" name=""/>
+        <p:cNvGrpSpPr/>
+        <p:nvPr/>
+      </p:nvGrpSpPr>
+      <p:grpSpPr>
+        <a:xfrm>
+          <a:off x="0" y="0"/>
+          <a:ext cx="0" cy="0"/>
+          <a:chOff x="0" y="0"/>
+          <a:chExt cx="0" cy="0"/>
+        </a:xfrm>
+      </p:grpSpPr>
+      <p:sp>
+        <p:nvSpPr>
+          <p:cNvPr id="2" name="Slide Image Placeholder 1"/>
+          <p:cNvSpPr>
+            <a:spLocks noGrp="1" noRot="1" noChangeAspect="1"/>
+          </p:cNvSpPr>
+          <p:nvPr>
+            <p:ph type="sldImg"/>
+          </p:nvPr>
+        </p:nvSpPr>
+        <p:spPr/>
+      </p:sp>
+      <p:sp>
+        <p:nvSpPr>
+          <p:cNvPr id="3" name="Notes Placeholder 2"/>
+          <p:cNvSpPr>
+            <a:spLocks noGrp="1"/>
+          </p:cNvSpPr>
+          <p:nvPr>
+            <p:ph type="body" idx="1"/>
+          </p:nvPr>
+        </p:nvSpPr>
+        <p:spPr/>
+        <p:txBody>
+          <a:bodyPr/>
+          <a:lstStyle/>
+          <a:p>
+            <a:endParaRPr lang="de-DE" dirty="0"/>
+          </a:p>
+        </p:txBody>
+      </p:sp>
+    </p:spTree>
+    <p:extLst>
+      <p:ext uri="{BB962C8B-B14F-4D97-AF65-F5344CB8AC3E}">
+        <p14:creationId xmlns:p14="http://schemas.microsoft.com/office/powerpoint/2010/main" val="384029855"/>
       </p:ext>
     </p:extLst>
   </p:cSld>
@@ -3181,7 +3491,7 @@
             <a:fld id="{1752D0F8-6159-4366-B54E-606536237956}" type="datetimeFigureOut">
               <a:rPr lang="de-DE" smtClean="0"/>
               <a:pPr/>
-              <a:t>07.07.24</a:t>
+              <a:t>09.07.24</a:t>
             </a:fld>
             <a:endParaRPr lang="de-DE"/>
           </a:p>
@@ -8460,7 +8770,7 @@
           <a:p>
             <a:fld id="{C764DE79-268F-4C1A-8933-263129D2AF90}" type="datetimeFigureOut">
               <a:rPr lang="en-US" dirty="0"/>
-              <a:t>7/7/24</a:t>
+              <a:t>7/9/24</a:t>
             </a:fld>
             <a:endParaRPr lang="en-US"/>
           </a:p>
@@ -9346,6 +9656,1213 @@
 </p:sld>
 </file>
 
+<file path=ppt/slides/slide10.xml><?xml version="1.0" encoding="utf-8"?>
+<p:sld xmlns:a="http://schemas.openxmlformats.org/drawingml/2006/main" xmlns:r="http://schemas.openxmlformats.org/officeDocument/2006/relationships" xmlns:p="http://schemas.openxmlformats.org/presentationml/2006/main">
+  <p:cSld>
+    <p:spTree>
+      <p:nvGrpSpPr>
+        <p:cNvPr id="1" name=""/>
+        <p:cNvGrpSpPr/>
+        <p:nvPr/>
+      </p:nvGrpSpPr>
+      <p:grpSpPr>
+        <a:xfrm>
+          <a:off x="0" y="0"/>
+          <a:ext cx="0" cy="0"/>
+          <a:chOff x="0" y="0"/>
+          <a:chExt cx="0" cy="0"/>
+        </a:xfrm>
+      </p:grpSpPr>
+      <p:sp>
+        <p:nvSpPr>
+          <p:cNvPr id="12" name="Rectangle 7"/>
+          <p:cNvSpPr>
+            <a:spLocks/>
+          </p:cNvSpPr>
+          <p:nvPr/>
+        </p:nvSpPr>
+        <p:spPr bwMode="auto">
+          <a:xfrm>
+            <a:off x="715617" y="1582532"/>
+            <a:ext cx="3368348" cy="2565067"/>
+          </a:xfrm>
+          <a:prstGeom prst="rect">
+            <a:avLst/>
+          </a:prstGeom>
+          <a:noFill/>
+          <a:ln>
+            <a:noFill/>
+          </a:ln>
+          <a:extLst>
+            <a:ext uri="{909E8E84-426E-40dd-AFC4-6F175D3DCCD1}">
+              <a14:hiddenFill xmlns="" xmlns:a14="http://schemas.microsoft.com/office/drawing/2010/main">
+                <a:solidFill>
+                  <a:srgbClr val="FFFFFF"/>
+                </a:solidFill>
+              </a14:hiddenFill>
+            </a:ext>
+            <a:ext uri="{91240B29-F687-4f45-9708-019B960494DF}">
+              <a14:hiddenLine xmlns="" xmlns:a14="http://schemas.microsoft.com/office/drawing/2010/main" w="12700" cap="flat">
+                <a:solidFill>
+                  <a:schemeClr val="tx1"/>
+                </a:solidFill>
+                <a:miter lim="800000"/>
+                <a:headEnd type="none" w="med" len="med"/>
+                <a:tailEnd type="none" w="med" len="med"/>
+              </a14:hiddenLine>
+            </a:ext>
+          </a:extLst>
+        </p:spPr>
+        <p:txBody>
+          <a:bodyPr lIns="0" tIns="0" rIns="0" bIns="0" anchor="t"/>
+          <a:lstStyle/>
+          <a:p>
+            <a:endParaRPr lang="en-US" sz="1800" dirty="0">
+              <a:ea typeface="ＭＳ Ｐゴシック" charset="0"/>
+              <a:sym typeface="Lato Light" charset="0"/>
+            </a:endParaRPr>
+          </a:p>
+        </p:txBody>
+      </p:sp>
+      <p:sp>
+        <p:nvSpPr>
+          <p:cNvPr id="24" name="Rectangle 7"/>
+          <p:cNvSpPr>
+            <a:spLocks/>
+          </p:cNvSpPr>
+          <p:nvPr/>
+        </p:nvSpPr>
+        <p:spPr bwMode="auto">
+          <a:xfrm>
+            <a:off x="5171902" y="1456376"/>
+            <a:ext cx="3256481" cy="2834318"/>
+          </a:xfrm>
+          <a:prstGeom prst="rect">
+            <a:avLst/>
+          </a:prstGeom>
+          <a:noFill/>
+          <a:ln>
+            <a:noFill/>
+          </a:ln>
+          <a:extLst>
+            <a:ext uri="{909E8E84-426E-40dd-AFC4-6F175D3DCCD1}">
+              <a14:hiddenFill xmlns="" xmlns:a14="http://schemas.microsoft.com/office/drawing/2010/main">
+                <a:solidFill>
+                  <a:srgbClr val="FFFFFF"/>
+                </a:solidFill>
+              </a14:hiddenFill>
+            </a:ext>
+            <a:ext uri="{91240B29-F687-4f45-9708-019B960494DF}">
+              <a14:hiddenLine xmlns="" xmlns:a14="http://schemas.microsoft.com/office/drawing/2010/main" w="12700" cap="flat">
+                <a:solidFill>
+                  <a:schemeClr val="tx1"/>
+                </a:solidFill>
+                <a:miter lim="800000"/>
+                <a:headEnd type="none" w="med" len="med"/>
+                <a:tailEnd type="none" w="med" len="med"/>
+              </a14:hiddenLine>
+            </a:ext>
+          </a:extLst>
+        </p:spPr>
+        <p:txBody>
+          <a:bodyPr lIns="0" tIns="0" rIns="0" bIns="0" anchor="t"/>
+          <a:lstStyle/>
+          <a:p>
+            <a:endParaRPr lang="en-US" sz="1800" dirty="0">
+              <a:ea typeface="ＭＳ Ｐゴシック" charset="0"/>
+              <a:cs typeface="Lato Light" charset="0"/>
+              <a:sym typeface="Lato Light" charset="0"/>
+            </a:endParaRPr>
+          </a:p>
+        </p:txBody>
+      </p:sp>
+      <p:sp>
+        <p:nvSpPr>
+          <p:cNvPr id="15" name="Title 14">
+            <a:extLst>
+              <a:ext uri="{FF2B5EF4-FFF2-40B4-BE49-F238E27FC236}">
+                <a16:creationId xmlns:a16="http://schemas.microsoft.com/office/drawing/2014/main" id="{AC70AFF7-D39C-1B45-8E56-844E670FBDCF}"/>
+              </a:ext>
+            </a:extLst>
+          </p:cNvPr>
+          <p:cNvSpPr>
+            <a:spLocks noGrp="1"/>
+          </p:cNvSpPr>
+          <p:nvPr>
+            <p:ph type="title"/>
+          </p:nvPr>
+        </p:nvSpPr>
+        <p:spPr>
+          <a:xfrm>
+            <a:off x="1122018" y="219808"/>
+            <a:ext cx="7647210" cy="638313"/>
+          </a:xfrm>
+        </p:spPr>
+        <p:txBody>
+          <a:bodyPr/>
+          <a:lstStyle/>
+          <a:p>
+            <a:r>
+              <a:rPr lang="en-US" dirty="0"/>
+              <a:t>Metrics server</a:t>
+            </a:r>
+          </a:p>
+        </p:txBody>
+      </p:sp>
+      <p:pic>
+        <p:nvPicPr>
+          <p:cNvPr id="4" name="Picture 3" descr="A blue hexagon with white and blue gears&#10;&#10;Description automatically generated">
+            <a:extLst>
+              <a:ext uri="{FF2B5EF4-FFF2-40B4-BE49-F238E27FC236}">
+                <a16:creationId xmlns:a16="http://schemas.microsoft.com/office/drawing/2014/main" id="{E3D5D9D7-1E4A-870B-BEC3-4F2878358332}"/>
+              </a:ext>
+            </a:extLst>
+          </p:cNvPr>
+          <p:cNvPicPr>
+            <a:picLocks noChangeAspect="1"/>
+          </p:cNvPicPr>
+          <p:nvPr/>
+        </p:nvPicPr>
+        <p:blipFill>
+          <a:blip r:embed="rId4"/>
+          <a:stretch>
+            <a:fillRect/>
+          </a:stretch>
+        </p:blipFill>
+        <p:spPr>
+          <a:xfrm>
+            <a:off x="309217" y="172437"/>
+            <a:ext cx="812800" cy="787400"/>
+          </a:xfrm>
+          <a:prstGeom prst="rect">
+            <a:avLst/>
+          </a:prstGeom>
+        </p:spPr>
+      </p:pic>
+      <p:sp>
+        <p:nvSpPr>
+          <p:cNvPr id="3" name="TextBox 2">
+            <a:extLst>
+              <a:ext uri="{FF2B5EF4-FFF2-40B4-BE49-F238E27FC236}">
+                <a16:creationId xmlns:a16="http://schemas.microsoft.com/office/drawing/2014/main" id="{01DFFC6A-AD3B-B8A5-A033-3135B2B7D9B6}"/>
+              </a:ext>
+            </a:extLst>
+          </p:cNvPr>
+          <p:cNvSpPr txBox="1"/>
+          <p:nvPr/>
+        </p:nvSpPr>
+        <p:spPr>
+          <a:xfrm>
+            <a:off x="890545" y="1662382"/>
+            <a:ext cx="7720717" cy="1323439"/>
+          </a:xfrm>
+          <a:prstGeom prst="rect">
+            <a:avLst/>
+          </a:prstGeom>
+          <a:noFill/>
+        </p:spPr>
+        <p:txBody>
+          <a:bodyPr wrap="square" rtlCol="0">
+            <a:spAutoFit/>
+          </a:bodyPr>
+          <a:lstStyle/>
+          <a:p>
+            <a:r>
+              <a:rPr lang="en-US" sz="1600" dirty="0" err="1">
+                <a:effectLst/>
+                <a:latin typeface="Consolas" panose="020B0609020204030204" pitchFamily="49" charset="0"/>
+                <a:cs typeface="Consolas" panose="020B0609020204030204" pitchFamily="49" charset="0"/>
+              </a:rPr>
+              <a:t>kubectl</a:t>
+            </a:r>
+            <a:r>
+              <a:rPr lang="en-US" sz="1600" dirty="0">
+                <a:effectLst/>
+                <a:latin typeface="Consolas" panose="020B0609020204030204" pitchFamily="49" charset="0"/>
+                <a:cs typeface="Consolas" panose="020B0609020204030204" pitchFamily="49" charset="0"/>
+              </a:rPr>
+              <a:t> create namespace metrics-server</a:t>
+            </a:r>
+            <a:br>
+              <a:rPr lang="en-US" sz="1600" dirty="0">
+                <a:effectLst/>
+                <a:latin typeface="Consolas" panose="020B0609020204030204" pitchFamily="49" charset="0"/>
+                <a:cs typeface="Consolas" panose="020B0609020204030204" pitchFamily="49" charset="0"/>
+              </a:rPr>
+            </a:br>
+            <a:r>
+              <a:rPr lang="en-US" sz="1600" dirty="0">
+                <a:effectLst/>
+                <a:latin typeface="Consolas" panose="020B0609020204030204" pitchFamily="49" charset="0"/>
+                <a:cs typeface="Consolas" panose="020B0609020204030204" pitchFamily="49" charset="0"/>
+              </a:rPr>
+              <a:t>helm upgrade --install metrics-server metrics-server/metrics-server --set </a:t>
+            </a:r>
+            <a:r>
+              <a:rPr lang="en-US" sz="1600" dirty="0" err="1">
+                <a:effectLst/>
+                <a:latin typeface="Consolas" panose="020B0609020204030204" pitchFamily="49" charset="0"/>
+                <a:cs typeface="Consolas" panose="020B0609020204030204" pitchFamily="49" charset="0"/>
+              </a:rPr>
+              <a:t>args</a:t>
+            </a:r>
+            <a:r>
+              <a:rPr lang="en-US" sz="1600" dirty="0">
+                <a:effectLst/>
+                <a:latin typeface="Consolas" panose="020B0609020204030204" pitchFamily="49" charset="0"/>
+                <a:cs typeface="Consolas" panose="020B0609020204030204" pitchFamily="49" charset="0"/>
+              </a:rPr>
+              <a:t>="{--</a:t>
+            </a:r>
+            <a:r>
+              <a:rPr lang="en-US" sz="1600" dirty="0" err="1">
+                <a:effectLst/>
+                <a:latin typeface="Consolas" panose="020B0609020204030204" pitchFamily="49" charset="0"/>
+                <a:cs typeface="Consolas" panose="020B0609020204030204" pitchFamily="49" charset="0"/>
+              </a:rPr>
+              <a:t>kubelet</a:t>
+            </a:r>
+            <a:r>
+              <a:rPr lang="en-US" sz="1600" dirty="0">
+                <a:effectLst/>
+                <a:latin typeface="Consolas" panose="020B0609020204030204" pitchFamily="49" charset="0"/>
+                <a:cs typeface="Consolas" panose="020B0609020204030204" pitchFamily="49" charset="0"/>
+              </a:rPr>
+              <a:t>-insecure-</a:t>
+            </a:r>
+            <a:r>
+              <a:rPr lang="en-US" sz="1600" dirty="0" err="1">
+                <a:effectLst/>
+                <a:latin typeface="Consolas" panose="020B0609020204030204" pitchFamily="49" charset="0"/>
+                <a:cs typeface="Consolas" panose="020B0609020204030204" pitchFamily="49" charset="0"/>
+              </a:rPr>
+              <a:t>tls</a:t>
+            </a:r>
+            <a:r>
+              <a:rPr lang="en-US" sz="1600" dirty="0">
+                <a:effectLst/>
+                <a:latin typeface="Consolas" panose="020B0609020204030204" pitchFamily="49" charset="0"/>
+                <a:cs typeface="Consolas" panose="020B0609020204030204" pitchFamily="49" charset="0"/>
+              </a:rPr>
+              <a:t>}" -n metrics-server</a:t>
+            </a:r>
+          </a:p>
+          <a:p>
+            <a:br>
+              <a:rPr lang="en-US" sz="1600" dirty="0">
+                <a:solidFill>
+                  <a:srgbClr val="A9B7C6"/>
+                </a:solidFill>
+                <a:effectLst/>
+              </a:rPr>
+            </a:br>
+            <a:r>
+              <a:rPr lang="en-US" sz="1600" dirty="0">
+                <a:solidFill>
+                  <a:srgbClr val="A9B7C6"/>
+                </a:solidFill>
+                <a:effectLst/>
+              </a:rPr>
+              <a:t>  </a:t>
+            </a:r>
+            <a:endParaRPr lang="en-US" sz="1600" dirty="0">
+              <a:effectLst/>
+            </a:endParaRPr>
+          </a:p>
+        </p:txBody>
+      </p:sp>
+    </p:spTree>
+    <p:custDataLst>
+      <p:tags r:id="rId1"/>
+    </p:custDataLst>
+    <p:extLst>
+      <p:ext uri="{BB962C8B-B14F-4D97-AF65-F5344CB8AC3E}">
+        <p14:creationId xmlns:p14="http://schemas.microsoft.com/office/powerpoint/2010/main" val="4066359896"/>
+      </p:ext>
+    </p:extLst>
+  </p:cSld>
+  <p:clrMapOvr>
+    <a:masterClrMapping/>
+  </p:clrMapOvr>
+  <mc:AlternateContent xmlns:mc="http://schemas.openxmlformats.org/markup-compatibility/2006">
+    <mc:Choice xmlns:p14="http://schemas.microsoft.com/office/powerpoint/2010/main" Requires="p14">
+      <p:transition spd="slow" p14:dur="2000" advTm="92152"/>
+    </mc:Choice>
+    <mc:Fallback>
+      <p:transition spd="slow" advTm="92152"/>
+    </mc:Fallback>
+  </mc:AlternateContent>
+</p:sld>
+</file>
+
+<file path=ppt/slides/slide11.xml><?xml version="1.0" encoding="utf-8"?>
+<p:sld xmlns:a="http://schemas.openxmlformats.org/drawingml/2006/main" xmlns:r="http://schemas.openxmlformats.org/officeDocument/2006/relationships" xmlns:p="http://schemas.openxmlformats.org/presentationml/2006/main">
+  <p:cSld>
+    <p:spTree>
+      <p:nvGrpSpPr>
+        <p:cNvPr id="1" name=""/>
+        <p:cNvGrpSpPr/>
+        <p:nvPr/>
+      </p:nvGrpSpPr>
+      <p:grpSpPr>
+        <a:xfrm>
+          <a:off x="0" y="0"/>
+          <a:ext cx="0" cy="0"/>
+          <a:chOff x="0" y="0"/>
+          <a:chExt cx="0" cy="0"/>
+        </a:xfrm>
+      </p:grpSpPr>
+      <p:sp>
+        <p:nvSpPr>
+          <p:cNvPr id="12" name="Rectangle 7"/>
+          <p:cNvSpPr>
+            <a:spLocks/>
+          </p:cNvSpPr>
+          <p:nvPr/>
+        </p:nvSpPr>
+        <p:spPr bwMode="auto">
+          <a:xfrm>
+            <a:off x="715617" y="1582532"/>
+            <a:ext cx="3368348" cy="2565067"/>
+          </a:xfrm>
+          <a:prstGeom prst="rect">
+            <a:avLst/>
+          </a:prstGeom>
+          <a:noFill/>
+          <a:ln>
+            <a:noFill/>
+          </a:ln>
+          <a:extLst>
+            <a:ext uri="{909E8E84-426E-40dd-AFC4-6F175D3DCCD1}">
+              <a14:hiddenFill xmlns:a14="http://schemas.microsoft.com/office/drawing/2010/main" xmlns="">
+                <a:solidFill>
+                  <a:srgbClr val="FFFFFF"/>
+                </a:solidFill>
+              </a14:hiddenFill>
+            </a:ext>
+            <a:ext uri="{91240B29-F687-4f45-9708-019B960494DF}">
+              <a14:hiddenLine xmlns:a14="http://schemas.microsoft.com/office/drawing/2010/main" xmlns="" w="12700" cap="flat">
+                <a:solidFill>
+                  <a:schemeClr val="tx1"/>
+                </a:solidFill>
+                <a:miter lim="800000"/>
+                <a:headEnd type="none" w="med" len="med"/>
+                <a:tailEnd type="none" w="med" len="med"/>
+              </a14:hiddenLine>
+            </a:ext>
+          </a:extLst>
+        </p:spPr>
+        <p:txBody>
+          <a:bodyPr lIns="0" tIns="0" rIns="0" bIns="0" anchor="t"/>
+          <a:lstStyle/>
+          <a:p>
+            <a:endParaRPr lang="en-US" sz="1800" dirty="0">
+              <a:ea typeface="ＭＳ Ｐゴシック" charset="0"/>
+              <a:sym typeface="Lato Light" charset="0"/>
+            </a:endParaRPr>
+          </a:p>
+        </p:txBody>
+      </p:sp>
+      <p:sp>
+        <p:nvSpPr>
+          <p:cNvPr id="24" name="Rectangle 7"/>
+          <p:cNvSpPr>
+            <a:spLocks/>
+          </p:cNvSpPr>
+          <p:nvPr/>
+        </p:nvSpPr>
+        <p:spPr bwMode="auto">
+          <a:xfrm>
+            <a:off x="5171902" y="1456376"/>
+            <a:ext cx="3256481" cy="2834318"/>
+          </a:xfrm>
+          <a:prstGeom prst="rect">
+            <a:avLst/>
+          </a:prstGeom>
+          <a:noFill/>
+          <a:ln>
+            <a:noFill/>
+          </a:ln>
+          <a:extLst>
+            <a:ext uri="{909E8E84-426E-40dd-AFC4-6F175D3DCCD1}">
+              <a14:hiddenFill xmlns:a14="http://schemas.microsoft.com/office/drawing/2010/main" xmlns="">
+                <a:solidFill>
+                  <a:srgbClr val="FFFFFF"/>
+                </a:solidFill>
+              </a14:hiddenFill>
+            </a:ext>
+            <a:ext uri="{91240B29-F687-4f45-9708-019B960494DF}">
+              <a14:hiddenLine xmlns:a14="http://schemas.microsoft.com/office/drawing/2010/main" xmlns="" w="12700" cap="flat">
+                <a:solidFill>
+                  <a:schemeClr val="tx1"/>
+                </a:solidFill>
+                <a:miter lim="800000"/>
+                <a:headEnd type="none" w="med" len="med"/>
+                <a:tailEnd type="none" w="med" len="med"/>
+              </a14:hiddenLine>
+            </a:ext>
+          </a:extLst>
+        </p:spPr>
+        <p:txBody>
+          <a:bodyPr lIns="0" tIns="0" rIns="0" bIns="0" anchor="t"/>
+          <a:lstStyle/>
+          <a:p>
+            <a:endParaRPr lang="en-US" sz="1800" dirty="0">
+              <a:ea typeface="ＭＳ Ｐゴシック" charset="0"/>
+              <a:cs typeface="Lato Light" charset="0"/>
+              <a:sym typeface="Lato Light" charset="0"/>
+            </a:endParaRPr>
+          </a:p>
+        </p:txBody>
+      </p:sp>
+      <p:sp>
+        <p:nvSpPr>
+          <p:cNvPr id="15" name="Title 14">
+            <a:extLst>
+              <a:ext uri="{FF2B5EF4-FFF2-40B4-BE49-F238E27FC236}">
+                <a16:creationId xmlns:a16="http://schemas.microsoft.com/office/drawing/2014/main" id="{AC70AFF7-D39C-1B45-8E56-844E670FBDCF}"/>
+              </a:ext>
+            </a:extLst>
+          </p:cNvPr>
+          <p:cNvSpPr>
+            <a:spLocks noGrp="1"/>
+          </p:cNvSpPr>
+          <p:nvPr>
+            <p:ph type="title"/>
+          </p:nvPr>
+        </p:nvSpPr>
+        <p:spPr>
+          <a:xfrm>
+            <a:off x="1122018" y="219808"/>
+            <a:ext cx="7647210" cy="638313"/>
+          </a:xfrm>
+        </p:spPr>
+        <p:txBody>
+          <a:bodyPr/>
+          <a:lstStyle/>
+          <a:p>
+            <a:r>
+              <a:rPr lang="en-US" dirty="0"/>
+              <a:t>Next steps</a:t>
+            </a:r>
+          </a:p>
+        </p:txBody>
+      </p:sp>
+      <p:pic>
+        <p:nvPicPr>
+          <p:cNvPr id="4" name="Picture 3" descr="A blue hexagon with white and blue gears&#10;&#10;Description automatically generated">
+            <a:extLst>
+              <a:ext uri="{FF2B5EF4-FFF2-40B4-BE49-F238E27FC236}">
+                <a16:creationId xmlns:a16="http://schemas.microsoft.com/office/drawing/2014/main" id="{E3D5D9D7-1E4A-870B-BEC3-4F2878358332}"/>
+              </a:ext>
+            </a:extLst>
+          </p:cNvPr>
+          <p:cNvPicPr>
+            <a:picLocks noChangeAspect="1"/>
+          </p:cNvPicPr>
+          <p:nvPr/>
+        </p:nvPicPr>
+        <p:blipFill>
+          <a:blip r:embed="rId4"/>
+          <a:stretch>
+            <a:fillRect/>
+          </a:stretch>
+        </p:blipFill>
+        <p:spPr>
+          <a:xfrm>
+            <a:off x="309217" y="172437"/>
+            <a:ext cx="812800" cy="787400"/>
+          </a:xfrm>
+          <a:prstGeom prst="rect">
+            <a:avLst/>
+          </a:prstGeom>
+        </p:spPr>
+      </p:pic>
+      <p:sp>
+        <p:nvSpPr>
+          <p:cNvPr id="3" name="TextBox 2">
+            <a:extLst>
+              <a:ext uri="{FF2B5EF4-FFF2-40B4-BE49-F238E27FC236}">
+                <a16:creationId xmlns:a16="http://schemas.microsoft.com/office/drawing/2014/main" id="{01DFFC6A-AD3B-B8A5-A033-3135B2B7D9B6}"/>
+              </a:ext>
+            </a:extLst>
+          </p:cNvPr>
+          <p:cNvSpPr txBox="1"/>
+          <p:nvPr/>
+        </p:nvSpPr>
+        <p:spPr>
+          <a:xfrm>
+            <a:off x="890545" y="1654431"/>
+            <a:ext cx="7720717" cy="1815882"/>
+          </a:xfrm>
+          <a:prstGeom prst="rect">
+            <a:avLst/>
+          </a:prstGeom>
+          <a:noFill/>
+        </p:spPr>
+        <p:txBody>
+          <a:bodyPr wrap="square" rtlCol="0">
+            <a:spAutoFit/>
+          </a:bodyPr>
+          <a:lstStyle/>
+          <a:p>
+            <a:r>
+              <a:rPr lang="en-US" sz="1600" dirty="0">
+                <a:effectLst/>
+                <a:latin typeface="Consolas" panose="020B0609020204030204" pitchFamily="49" charset="0"/>
+                <a:cs typeface="Consolas" panose="020B0609020204030204" pitchFamily="49" charset="0"/>
+                <a:hlinkClick r:id="rId5"/>
+              </a:rPr>
+              <a:t>https://github.com/ybaryshnikova/extensions-meetup/blob/master/README.md</a:t>
+            </a:r>
+          </a:p>
+          <a:p>
+            <a:endParaRPr lang="en-US" sz="1600" dirty="0">
+              <a:latin typeface="Consolas" panose="020B0609020204030204" pitchFamily="49" charset="0"/>
+              <a:cs typeface="Consolas" panose="020B0609020204030204" pitchFamily="49" charset="0"/>
+              <a:hlinkClick r:id="rId5"/>
+            </a:endParaRPr>
+          </a:p>
+          <a:p>
+            <a:r>
+              <a:rPr lang="en-US" sz="1600" dirty="0">
+                <a:effectLst/>
+                <a:latin typeface="Consolas" panose="020B0609020204030204" pitchFamily="49" charset="0"/>
+                <a:cs typeface="Consolas" panose="020B0609020204030204" pitchFamily="49" charset="0"/>
+                <a:hlinkClick r:id="rId5"/>
+              </a:rPr>
+              <a:t>https://github.com/ybaryshnikova/extensions-meetup/tree/master/apiservice-example</a:t>
+            </a:r>
+            <a:endParaRPr lang="en-US" sz="1600" dirty="0">
+              <a:latin typeface="Consolas" panose="020B0609020204030204" pitchFamily="49" charset="0"/>
+              <a:cs typeface="Consolas" panose="020B0609020204030204" pitchFamily="49" charset="0"/>
+            </a:endParaRPr>
+          </a:p>
+          <a:p>
+            <a:endParaRPr lang="en-US" sz="1600" dirty="0">
+              <a:effectLst/>
+              <a:latin typeface="Consolas" panose="020B0609020204030204" pitchFamily="49" charset="0"/>
+              <a:cs typeface="Consolas" panose="020B0609020204030204" pitchFamily="49" charset="0"/>
+            </a:endParaRPr>
+          </a:p>
+          <a:p>
+            <a:r>
+              <a:rPr lang="en-US" sz="1600" dirty="0">
+                <a:effectLst/>
+                <a:latin typeface="Consolas" panose="020B0609020204030204" pitchFamily="49" charset="0"/>
+                <a:cs typeface="Consolas" panose="020B0609020204030204" pitchFamily="49" charset="0"/>
+              </a:rPr>
+              <a:t>Follow the metrics tutorial</a:t>
+            </a:r>
+            <a:r>
+              <a:rPr lang="en-US" sz="1600" dirty="0">
+                <a:latin typeface="Consolas" panose="020B0609020204030204" pitchFamily="49" charset="0"/>
+                <a:cs typeface="Consolas" panose="020B0609020204030204" pitchFamily="49" charset="0"/>
+              </a:rPr>
+              <a:t> (link in references)</a:t>
+            </a:r>
+            <a:endParaRPr lang="en-US" sz="1600" dirty="0">
+              <a:effectLst/>
+            </a:endParaRPr>
+          </a:p>
+        </p:txBody>
+      </p:sp>
+    </p:spTree>
+    <p:custDataLst>
+      <p:tags r:id="rId1"/>
+    </p:custDataLst>
+    <p:extLst>
+      <p:ext uri="{BB962C8B-B14F-4D97-AF65-F5344CB8AC3E}">
+        <p14:creationId xmlns:p14="http://schemas.microsoft.com/office/powerpoint/2010/main" val="887962464"/>
+      </p:ext>
+    </p:extLst>
+  </p:cSld>
+  <p:clrMapOvr>
+    <a:masterClrMapping/>
+  </p:clrMapOvr>
+  <mc:AlternateContent xmlns:mc="http://schemas.openxmlformats.org/markup-compatibility/2006">
+    <mc:Choice xmlns:p14="http://schemas.microsoft.com/office/powerpoint/2010/main" Requires="p14">
+      <p:transition spd="slow" p14:dur="2000" advTm="92152"/>
+    </mc:Choice>
+    <mc:Fallback>
+      <p:transition spd="slow" advTm="92152"/>
+    </mc:Fallback>
+  </mc:AlternateContent>
+</p:sld>
+</file>
+
+<file path=ppt/slides/slide12.xml><?xml version="1.0" encoding="utf-8"?>
+<p:sld xmlns:a="http://schemas.openxmlformats.org/drawingml/2006/main" xmlns:r="http://schemas.openxmlformats.org/officeDocument/2006/relationships" xmlns:p="http://schemas.openxmlformats.org/presentationml/2006/main">
+  <p:cSld>
+    <p:spTree>
+      <p:nvGrpSpPr>
+        <p:cNvPr id="1" name=""/>
+        <p:cNvGrpSpPr/>
+        <p:nvPr/>
+      </p:nvGrpSpPr>
+      <p:grpSpPr>
+        <a:xfrm>
+          <a:off x="0" y="0"/>
+          <a:ext cx="0" cy="0"/>
+          <a:chOff x="0" y="0"/>
+          <a:chExt cx="0" cy="0"/>
+        </a:xfrm>
+      </p:grpSpPr>
+      <p:sp>
+        <p:nvSpPr>
+          <p:cNvPr id="12" name="Rectangle 7"/>
+          <p:cNvSpPr>
+            <a:spLocks/>
+          </p:cNvSpPr>
+          <p:nvPr/>
+        </p:nvSpPr>
+        <p:spPr bwMode="auto">
+          <a:xfrm>
+            <a:off x="715617" y="1582532"/>
+            <a:ext cx="3368348" cy="2565067"/>
+          </a:xfrm>
+          <a:prstGeom prst="rect">
+            <a:avLst/>
+          </a:prstGeom>
+          <a:noFill/>
+          <a:ln>
+            <a:noFill/>
+          </a:ln>
+          <a:extLst>
+            <a:ext uri="{909E8E84-426E-40dd-AFC4-6F175D3DCCD1}">
+              <a14:hiddenFill xmlns:a14="http://schemas.microsoft.com/office/drawing/2010/main" xmlns="">
+                <a:solidFill>
+                  <a:srgbClr val="FFFFFF"/>
+                </a:solidFill>
+              </a14:hiddenFill>
+            </a:ext>
+            <a:ext uri="{91240B29-F687-4f45-9708-019B960494DF}">
+              <a14:hiddenLine xmlns:a14="http://schemas.microsoft.com/office/drawing/2010/main" xmlns="" w="12700" cap="flat">
+                <a:solidFill>
+                  <a:schemeClr val="tx1"/>
+                </a:solidFill>
+                <a:miter lim="800000"/>
+                <a:headEnd type="none" w="med" len="med"/>
+                <a:tailEnd type="none" w="med" len="med"/>
+              </a14:hiddenLine>
+            </a:ext>
+          </a:extLst>
+        </p:spPr>
+        <p:txBody>
+          <a:bodyPr lIns="0" tIns="0" rIns="0" bIns="0" anchor="t"/>
+          <a:lstStyle/>
+          <a:p>
+            <a:endParaRPr lang="en-US" sz="1800" dirty="0">
+              <a:ea typeface="ＭＳ Ｐゴシック" charset="0"/>
+              <a:sym typeface="Lato Light" charset="0"/>
+            </a:endParaRPr>
+          </a:p>
+        </p:txBody>
+      </p:sp>
+      <p:sp>
+        <p:nvSpPr>
+          <p:cNvPr id="24" name="Rectangle 7"/>
+          <p:cNvSpPr>
+            <a:spLocks/>
+          </p:cNvSpPr>
+          <p:nvPr/>
+        </p:nvSpPr>
+        <p:spPr bwMode="auto">
+          <a:xfrm>
+            <a:off x="5171902" y="1456376"/>
+            <a:ext cx="3256481" cy="2834318"/>
+          </a:xfrm>
+          <a:prstGeom prst="rect">
+            <a:avLst/>
+          </a:prstGeom>
+          <a:noFill/>
+          <a:ln>
+            <a:noFill/>
+          </a:ln>
+          <a:extLst>
+            <a:ext uri="{909E8E84-426E-40dd-AFC4-6F175D3DCCD1}">
+              <a14:hiddenFill xmlns:a14="http://schemas.microsoft.com/office/drawing/2010/main" xmlns="">
+                <a:solidFill>
+                  <a:srgbClr val="FFFFFF"/>
+                </a:solidFill>
+              </a14:hiddenFill>
+            </a:ext>
+            <a:ext uri="{91240B29-F687-4f45-9708-019B960494DF}">
+              <a14:hiddenLine xmlns:a14="http://schemas.microsoft.com/office/drawing/2010/main" xmlns="" w="12700" cap="flat">
+                <a:solidFill>
+                  <a:schemeClr val="tx1"/>
+                </a:solidFill>
+                <a:miter lim="800000"/>
+                <a:headEnd type="none" w="med" len="med"/>
+                <a:tailEnd type="none" w="med" len="med"/>
+              </a14:hiddenLine>
+            </a:ext>
+          </a:extLst>
+        </p:spPr>
+        <p:txBody>
+          <a:bodyPr lIns="0" tIns="0" rIns="0" bIns="0" anchor="t"/>
+          <a:lstStyle/>
+          <a:p>
+            <a:endParaRPr lang="en-US" sz="1800" dirty="0">
+              <a:ea typeface="ＭＳ Ｐゴシック" charset="0"/>
+              <a:cs typeface="Lato Light" charset="0"/>
+              <a:sym typeface="Lato Light" charset="0"/>
+            </a:endParaRPr>
+          </a:p>
+        </p:txBody>
+      </p:sp>
+      <p:sp>
+        <p:nvSpPr>
+          <p:cNvPr id="15" name="Title 14">
+            <a:extLst>
+              <a:ext uri="{FF2B5EF4-FFF2-40B4-BE49-F238E27FC236}">
+                <a16:creationId xmlns:a16="http://schemas.microsoft.com/office/drawing/2014/main" id="{AC70AFF7-D39C-1B45-8E56-844E670FBDCF}"/>
+              </a:ext>
+            </a:extLst>
+          </p:cNvPr>
+          <p:cNvSpPr>
+            <a:spLocks noGrp="1"/>
+          </p:cNvSpPr>
+          <p:nvPr>
+            <p:ph type="title"/>
+          </p:nvPr>
+        </p:nvSpPr>
+        <p:spPr>
+          <a:xfrm>
+            <a:off x="1122018" y="219808"/>
+            <a:ext cx="7647210" cy="638313"/>
+          </a:xfrm>
+        </p:spPr>
+        <p:txBody>
+          <a:bodyPr/>
+          <a:lstStyle/>
+          <a:p>
+            <a:r>
+              <a:rPr lang="en-US" dirty="0"/>
+              <a:t>References</a:t>
+            </a:r>
+          </a:p>
+        </p:txBody>
+      </p:sp>
+      <p:pic>
+        <p:nvPicPr>
+          <p:cNvPr id="4" name="Picture 3" descr="A blue hexagon with white and blue gears&#10;&#10;Description automatically generated">
+            <a:extLst>
+              <a:ext uri="{FF2B5EF4-FFF2-40B4-BE49-F238E27FC236}">
+                <a16:creationId xmlns:a16="http://schemas.microsoft.com/office/drawing/2014/main" id="{E3D5D9D7-1E4A-870B-BEC3-4F2878358332}"/>
+              </a:ext>
+            </a:extLst>
+          </p:cNvPr>
+          <p:cNvPicPr>
+            <a:picLocks noChangeAspect="1"/>
+          </p:cNvPicPr>
+          <p:nvPr/>
+        </p:nvPicPr>
+        <p:blipFill>
+          <a:blip r:embed="rId4"/>
+          <a:stretch>
+            <a:fillRect/>
+          </a:stretch>
+        </p:blipFill>
+        <p:spPr>
+          <a:xfrm>
+            <a:off x="309217" y="172437"/>
+            <a:ext cx="812800" cy="787400"/>
+          </a:xfrm>
+          <a:prstGeom prst="rect">
+            <a:avLst/>
+          </a:prstGeom>
+        </p:spPr>
+      </p:pic>
+      <p:sp>
+        <p:nvSpPr>
+          <p:cNvPr id="3" name="TextBox 2">
+            <a:extLst>
+              <a:ext uri="{FF2B5EF4-FFF2-40B4-BE49-F238E27FC236}">
+                <a16:creationId xmlns:a16="http://schemas.microsoft.com/office/drawing/2014/main" id="{01DFFC6A-AD3B-B8A5-A033-3135B2B7D9B6}"/>
+              </a:ext>
+            </a:extLst>
+          </p:cNvPr>
+          <p:cNvSpPr txBox="1"/>
+          <p:nvPr/>
+        </p:nvSpPr>
+        <p:spPr>
+          <a:xfrm>
+            <a:off x="890545" y="1662382"/>
+            <a:ext cx="7720717" cy="2308324"/>
+          </a:xfrm>
+          <a:prstGeom prst="rect">
+            <a:avLst/>
+          </a:prstGeom>
+          <a:noFill/>
+        </p:spPr>
+        <p:txBody>
+          <a:bodyPr wrap="square" rtlCol="0">
+            <a:spAutoFit/>
+          </a:bodyPr>
+          <a:lstStyle/>
+          <a:p>
+            <a:r>
+              <a:rPr lang="en-US" sz="1600" dirty="0">
+                <a:solidFill>
+                  <a:srgbClr val="287BDE"/>
+                </a:solidFill>
+                <a:effectLst/>
+                <a:hlinkClick r:id="rId5"/>
+              </a:rPr>
+              <a:t>Kubernetes API guide</a:t>
+            </a:r>
+            <a:endParaRPr lang="en-US" sz="1600" dirty="0">
+              <a:solidFill>
+                <a:srgbClr val="A9B7C6"/>
+              </a:solidFill>
+              <a:effectLst/>
+            </a:endParaRPr>
+          </a:p>
+          <a:p>
+            <a:endParaRPr lang="en-US" sz="1600" dirty="0">
+              <a:solidFill>
+                <a:srgbClr val="A9B7C6"/>
+              </a:solidFill>
+            </a:endParaRPr>
+          </a:p>
+          <a:p>
+            <a:r>
+              <a:rPr lang="en-US" sz="1600" dirty="0">
+                <a:solidFill>
+                  <a:srgbClr val="287BDE"/>
+                </a:solidFill>
+                <a:effectLst/>
+                <a:hlinkClick r:id="rId6"/>
+              </a:rPr>
+              <a:t>Kubernetes Python client </a:t>
+            </a:r>
+            <a:r>
+              <a:rPr lang="en-US" sz="1600">
+                <a:solidFill>
+                  <a:srgbClr val="287BDE"/>
+                </a:solidFill>
+                <a:effectLst/>
+                <a:hlinkClick r:id="rId6"/>
+              </a:rPr>
+              <a:t>custom API</a:t>
+            </a:r>
+            <a:br>
+              <a:rPr lang="en-US" sz="1600" dirty="0">
+                <a:solidFill>
+                  <a:srgbClr val="A9B7C6"/>
+                </a:solidFill>
+                <a:effectLst/>
+              </a:rPr>
+            </a:br>
+            <a:br>
+              <a:rPr lang="en-US" sz="1600" dirty="0">
+                <a:solidFill>
+                  <a:srgbClr val="A9B7C6"/>
+                </a:solidFill>
+                <a:effectLst/>
+              </a:rPr>
+            </a:br>
+            <a:r>
+              <a:rPr lang="en-US" sz="1600" dirty="0">
+                <a:solidFill>
+                  <a:srgbClr val="287BDE"/>
+                </a:solidFill>
+                <a:effectLst/>
+                <a:hlinkClick r:id="rId7"/>
+              </a:rPr>
+              <a:t>Working with Kubernetes API Series</a:t>
+            </a:r>
+            <a:br>
+              <a:rPr lang="en-US" sz="1600" dirty="0">
+                <a:solidFill>
+                  <a:srgbClr val="A9B7C6"/>
+                </a:solidFill>
+                <a:effectLst/>
+              </a:rPr>
+            </a:br>
+            <a:br>
+              <a:rPr lang="en-US" sz="1600" dirty="0">
+                <a:solidFill>
+                  <a:srgbClr val="A9B7C6"/>
+                </a:solidFill>
+                <a:effectLst/>
+              </a:rPr>
+            </a:br>
+            <a:r>
+              <a:rPr lang="en-US" sz="1600" dirty="0">
+                <a:solidFill>
+                  <a:srgbClr val="287BDE"/>
+                </a:solidFill>
+                <a:effectLst/>
+                <a:hlinkClick r:id="rId8"/>
+              </a:rPr>
+              <a:t>Metrics server tutorial</a:t>
+            </a:r>
+            <a:endParaRPr lang="en-US" sz="1600" dirty="0">
+              <a:solidFill>
+                <a:srgbClr val="A9B7C6"/>
+              </a:solidFill>
+              <a:effectLst/>
+            </a:endParaRPr>
+          </a:p>
+          <a:p>
+            <a:br>
+              <a:rPr lang="en-US" sz="1600" dirty="0">
+                <a:solidFill>
+                  <a:srgbClr val="A9B7C6"/>
+                </a:solidFill>
+                <a:effectLst/>
+              </a:rPr>
+            </a:br>
+            <a:r>
+              <a:rPr lang="en-US" sz="1600" dirty="0">
+                <a:solidFill>
+                  <a:srgbClr val="A9B7C6"/>
+                </a:solidFill>
+                <a:effectLst/>
+              </a:rPr>
+              <a:t>  </a:t>
+            </a:r>
+            <a:endParaRPr lang="en-US" sz="1600" dirty="0">
+              <a:effectLst/>
+            </a:endParaRPr>
+          </a:p>
+        </p:txBody>
+      </p:sp>
+    </p:spTree>
+    <p:custDataLst>
+      <p:tags r:id="rId1"/>
+    </p:custDataLst>
+    <p:extLst>
+      <p:ext uri="{BB962C8B-B14F-4D97-AF65-F5344CB8AC3E}">
+        <p14:creationId xmlns:p14="http://schemas.microsoft.com/office/powerpoint/2010/main" val="3137908034"/>
+      </p:ext>
+    </p:extLst>
+  </p:cSld>
+  <p:clrMapOvr>
+    <a:masterClrMapping/>
+  </p:clrMapOvr>
+  <mc:AlternateContent xmlns:mc="http://schemas.openxmlformats.org/markup-compatibility/2006">
+    <mc:Choice xmlns:p14="http://schemas.microsoft.com/office/powerpoint/2010/main" Requires="p14">
+      <p:transition spd="slow" p14:dur="2000" advTm="92152"/>
+    </mc:Choice>
+    <mc:Fallback>
+      <p:transition spd="slow" advTm="92152"/>
+    </mc:Fallback>
+  </mc:AlternateContent>
+</p:sld>
+</file>
+
+<file path=ppt/slides/slide13.xml><?xml version="1.0" encoding="utf-8"?>
+<p:sld xmlns:a="http://schemas.openxmlformats.org/drawingml/2006/main" xmlns:r="http://schemas.openxmlformats.org/officeDocument/2006/relationships" xmlns:p="http://schemas.openxmlformats.org/presentationml/2006/main">
+  <p:cSld>
+    <p:spTree>
+      <p:nvGrpSpPr>
+        <p:cNvPr id="1" name=""/>
+        <p:cNvGrpSpPr/>
+        <p:nvPr/>
+      </p:nvGrpSpPr>
+      <p:grpSpPr>
+        <a:xfrm>
+          <a:off x="0" y="0"/>
+          <a:ext cx="0" cy="0"/>
+          <a:chOff x="0" y="0"/>
+          <a:chExt cx="0" cy="0"/>
+        </a:xfrm>
+      </p:grpSpPr>
+      <p:sp>
+        <p:nvSpPr>
+          <p:cNvPr id="12" name="Rectangle 7"/>
+          <p:cNvSpPr>
+            <a:spLocks/>
+          </p:cNvSpPr>
+          <p:nvPr/>
+        </p:nvSpPr>
+        <p:spPr bwMode="auto">
+          <a:xfrm>
+            <a:off x="715617" y="1582532"/>
+            <a:ext cx="3368348" cy="2565067"/>
+          </a:xfrm>
+          <a:prstGeom prst="rect">
+            <a:avLst/>
+          </a:prstGeom>
+          <a:noFill/>
+          <a:ln>
+            <a:noFill/>
+          </a:ln>
+          <a:extLst>
+            <a:ext uri="{909E8E84-426E-40dd-AFC4-6F175D3DCCD1}">
+              <a14:hiddenFill xmlns:a14="http://schemas.microsoft.com/office/drawing/2010/main" xmlns="">
+                <a:solidFill>
+                  <a:srgbClr val="FFFFFF"/>
+                </a:solidFill>
+              </a14:hiddenFill>
+            </a:ext>
+            <a:ext uri="{91240B29-F687-4f45-9708-019B960494DF}">
+              <a14:hiddenLine xmlns:a14="http://schemas.microsoft.com/office/drawing/2010/main" xmlns="" w="12700" cap="flat">
+                <a:solidFill>
+                  <a:schemeClr val="tx1"/>
+                </a:solidFill>
+                <a:miter lim="800000"/>
+                <a:headEnd type="none" w="med" len="med"/>
+                <a:tailEnd type="none" w="med" len="med"/>
+              </a14:hiddenLine>
+            </a:ext>
+          </a:extLst>
+        </p:spPr>
+        <p:txBody>
+          <a:bodyPr lIns="0" tIns="0" rIns="0" bIns="0" anchor="t"/>
+          <a:lstStyle/>
+          <a:p>
+            <a:endParaRPr lang="en-US" sz="1800" dirty="0">
+              <a:ea typeface="ＭＳ Ｐゴシック" charset="0"/>
+              <a:sym typeface="Lato Light" charset="0"/>
+            </a:endParaRPr>
+          </a:p>
+        </p:txBody>
+      </p:sp>
+      <p:sp>
+        <p:nvSpPr>
+          <p:cNvPr id="24" name="Rectangle 7"/>
+          <p:cNvSpPr>
+            <a:spLocks/>
+          </p:cNvSpPr>
+          <p:nvPr/>
+        </p:nvSpPr>
+        <p:spPr bwMode="auto">
+          <a:xfrm>
+            <a:off x="5171902" y="1456376"/>
+            <a:ext cx="3256481" cy="2834318"/>
+          </a:xfrm>
+          <a:prstGeom prst="rect">
+            <a:avLst/>
+          </a:prstGeom>
+          <a:noFill/>
+          <a:ln>
+            <a:noFill/>
+          </a:ln>
+          <a:extLst>
+            <a:ext uri="{909E8E84-426E-40dd-AFC4-6F175D3DCCD1}">
+              <a14:hiddenFill xmlns:a14="http://schemas.microsoft.com/office/drawing/2010/main" xmlns="">
+                <a:solidFill>
+                  <a:srgbClr val="FFFFFF"/>
+                </a:solidFill>
+              </a14:hiddenFill>
+            </a:ext>
+            <a:ext uri="{91240B29-F687-4f45-9708-019B960494DF}">
+              <a14:hiddenLine xmlns:a14="http://schemas.microsoft.com/office/drawing/2010/main" xmlns="" w="12700" cap="flat">
+                <a:solidFill>
+                  <a:schemeClr val="tx1"/>
+                </a:solidFill>
+                <a:miter lim="800000"/>
+                <a:headEnd type="none" w="med" len="med"/>
+                <a:tailEnd type="none" w="med" len="med"/>
+              </a14:hiddenLine>
+            </a:ext>
+          </a:extLst>
+        </p:spPr>
+        <p:txBody>
+          <a:bodyPr lIns="0" tIns="0" rIns="0" bIns="0" anchor="t"/>
+          <a:lstStyle/>
+          <a:p>
+            <a:endParaRPr lang="en-US" sz="1800" dirty="0">
+              <a:ea typeface="ＭＳ Ｐゴシック" charset="0"/>
+              <a:cs typeface="Lato Light" charset="0"/>
+              <a:sym typeface="Lato Light" charset="0"/>
+            </a:endParaRPr>
+          </a:p>
+        </p:txBody>
+      </p:sp>
+      <p:pic>
+        <p:nvPicPr>
+          <p:cNvPr id="4" name="Picture 3" descr="A blue hexagon with white and blue gears&#10;&#10;Description automatically generated">
+            <a:extLst>
+              <a:ext uri="{FF2B5EF4-FFF2-40B4-BE49-F238E27FC236}">
+                <a16:creationId xmlns:a16="http://schemas.microsoft.com/office/drawing/2014/main" id="{E3D5D9D7-1E4A-870B-BEC3-4F2878358332}"/>
+              </a:ext>
+            </a:extLst>
+          </p:cNvPr>
+          <p:cNvPicPr>
+            <a:picLocks noChangeAspect="1"/>
+          </p:cNvPicPr>
+          <p:nvPr/>
+        </p:nvPicPr>
+        <p:blipFill>
+          <a:blip r:embed="rId4"/>
+          <a:stretch>
+            <a:fillRect/>
+          </a:stretch>
+        </p:blipFill>
+        <p:spPr>
+          <a:xfrm>
+            <a:off x="2636485" y="1659592"/>
+            <a:ext cx="812800" cy="787400"/>
+          </a:xfrm>
+          <a:prstGeom prst="rect">
+            <a:avLst/>
+          </a:prstGeom>
+        </p:spPr>
+      </p:pic>
+      <p:sp>
+        <p:nvSpPr>
+          <p:cNvPr id="2" name="TextBox 1">
+            <a:extLst>
+              <a:ext uri="{FF2B5EF4-FFF2-40B4-BE49-F238E27FC236}">
+                <a16:creationId xmlns:a16="http://schemas.microsoft.com/office/drawing/2014/main" id="{0A1C82F2-FD3D-4DDB-6D43-D9AD5ACAFF63}"/>
+              </a:ext>
+            </a:extLst>
+          </p:cNvPr>
+          <p:cNvSpPr txBox="1"/>
+          <p:nvPr/>
+        </p:nvSpPr>
+        <p:spPr>
+          <a:xfrm>
+            <a:off x="3776564" y="1822459"/>
+            <a:ext cx="3076412" cy="646331"/>
+          </a:xfrm>
+          <a:prstGeom prst="rect">
+            <a:avLst/>
+          </a:prstGeom>
+          <a:noFill/>
+        </p:spPr>
+        <p:txBody>
+          <a:bodyPr wrap="square" rtlCol="0">
+            <a:spAutoFit/>
+          </a:bodyPr>
+          <a:lstStyle/>
+          <a:p>
+            <a:r>
+              <a:rPr lang="en-US" sz="3600" dirty="0"/>
+              <a:t>Questions?</a:t>
+            </a:r>
+          </a:p>
+        </p:txBody>
+      </p:sp>
+    </p:spTree>
+    <p:custDataLst>
+      <p:tags r:id="rId1"/>
+    </p:custDataLst>
+    <p:extLst>
+      <p:ext uri="{BB962C8B-B14F-4D97-AF65-F5344CB8AC3E}">
+        <p14:creationId xmlns:p14="http://schemas.microsoft.com/office/powerpoint/2010/main" val="1055841147"/>
+      </p:ext>
+    </p:extLst>
+  </p:cSld>
+  <p:clrMapOvr>
+    <a:masterClrMapping/>
+  </p:clrMapOvr>
+  <mc:AlternateContent xmlns:mc="http://schemas.openxmlformats.org/markup-compatibility/2006" xmlns:p14="http://schemas.microsoft.com/office/powerpoint/2010/main">
+    <mc:Choice Requires="p14">
+      <p:transition spd="slow" p14:dur="2000" advTm="92152"/>
+    </mc:Choice>
+    <mc:Fallback xmlns="">
+      <p:transition spd="slow" advTm="92152"/>
+    </mc:Fallback>
+  </mc:AlternateContent>
+</p:sld>
+</file>
+
 <file path=ppt/slides/slide2.xml><?xml version="1.0" encoding="utf-8"?>
 <p:sld xmlns:a="http://schemas.openxmlformats.org/drawingml/2006/main" xmlns:r="http://schemas.openxmlformats.org/officeDocument/2006/relationships" xmlns:p="http://schemas.openxmlformats.org/presentationml/2006/main">
   <p:cSld>
@@ -9385,14 +10902,14 @@
           </a:ln>
           <a:extLst>
             <a:ext uri="{909E8E84-426E-40dd-AFC4-6F175D3DCCD1}">
-              <a14:hiddenFill xmlns="" xmlns:a14="http://schemas.microsoft.com/office/drawing/2010/main">
+              <a14:hiddenFill xmlns:a14="http://schemas.microsoft.com/office/drawing/2010/main" xmlns="">
                 <a:solidFill>
                   <a:srgbClr val="FFFFFF"/>
                 </a:solidFill>
               </a14:hiddenFill>
             </a:ext>
             <a:ext uri="{91240B29-F687-4f45-9708-019B960494DF}">
-              <a14:hiddenLine xmlns="" xmlns:a14="http://schemas.microsoft.com/office/drawing/2010/main" w="12700" cap="flat">
+              <a14:hiddenLine xmlns:a14="http://schemas.microsoft.com/office/drawing/2010/main" xmlns="" w="12700" cap="flat">
                 <a:solidFill>
                   <a:schemeClr val="tx1"/>
                 </a:solidFill>
@@ -9436,14 +10953,14 @@
           </a:ln>
           <a:extLst>
             <a:ext uri="{909E8E84-426E-40dd-AFC4-6F175D3DCCD1}">
-              <a14:hiddenFill xmlns="" xmlns:a14="http://schemas.microsoft.com/office/drawing/2010/main">
+              <a14:hiddenFill xmlns:a14="http://schemas.microsoft.com/office/drawing/2010/main" xmlns="">
                 <a:solidFill>
                   <a:srgbClr val="FFFFFF"/>
                 </a:solidFill>
               </a14:hiddenFill>
             </a:ext>
             <a:ext uri="{91240B29-F687-4f45-9708-019B960494DF}">
-              <a14:hiddenLine xmlns="" xmlns:a14="http://schemas.microsoft.com/office/drawing/2010/main" w="12700" cap="flat">
+              <a14:hiddenLine xmlns:a14="http://schemas.microsoft.com/office/drawing/2010/main" xmlns="" w="12700" cap="flat">
                 <a:solidFill>
                   <a:schemeClr val="tx1"/>
                 </a:solidFill>
@@ -9902,14 +11419,14 @@
           </a:ln>
           <a:extLst>
             <a:ext uri="{909E8E84-426E-40dd-AFC4-6F175D3DCCD1}">
-              <a14:hiddenFill xmlns:a14="http://schemas.microsoft.com/office/drawing/2010/main" xmlns="">
+              <a14:hiddenFill xmlns="" xmlns:a14="http://schemas.microsoft.com/office/drawing/2010/main">
                 <a:solidFill>
                   <a:srgbClr val="FFFFFF"/>
                 </a:solidFill>
               </a14:hiddenFill>
             </a:ext>
             <a:ext uri="{91240B29-F687-4f45-9708-019B960494DF}">
-              <a14:hiddenLine xmlns:a14="http://schemas.microsoft.com/office/drawing/2010/main" xmlns="" w="12700" cap="flat">
+              <a14:hiddenLine xmlns="" xmlns:a14="http://schemas.microsoft.com/office/drawing/2010/main" w="12700" cap="flat">
                 <a:solidFill>
                   <a:schemeClr val="tx1"/>
                 </a:solidFill>
@@ -9953,14 +11470,14 @@
           </a:ln>
           <a:extLst>
             <a:ext uri="{909E8E84-426E-40dd-AFC4-6F175D3DCCD1}">
-              <a14:hiddenFill xmlns:a14="http://schemas.microsoft.com/office/drawing/2010/main" xmlns="">
+              <a14:hiddenFill xmlns="" xmlns:a14="http://schemas.microsoft.com/office/drawing/2010/main">
                 <a:solidFill>
                   <a:srgbClr val="FFFFFF"/>
                 </a:solidFill>
               </a14:hiddenFill>
             </a:ext>
             <a:ext uri="{91240B29-F687-4f45-9708-019B960494DF}">
-              <a14:hiddenLine xmlns:a14="http://schemas.microsoft.com/office/drawing/2010/main" xmlns="" w="12700" cap="flat">
+              <a14:hiddenLine xmlns="" xmlns:a14="http://schemas.microsoft.com/office/drawing/2010/main" w="12700" cap="flat">
                 <a:solidFill>
                   <a:schemeClr val="tx1"/>
                 </a:solidFill>
@@ -10141,11 +11658,11 @@
   <p:clrMapOvr>
     <a:masterClrMapping/>
   </p:clrMapOvr>
-  <mc:AlternateContent xmlns:mc="http://schemas.openxmlformats.org/markup-compatibility/2006">
-    <mc:Choice xmlns:p14="http://schemas.microsoft.com/office/powerpoint/2010/main" Requires="p14">
+  <mc:AlternateContent xmlns:mc="http://schemas.openxmlformats.org/markup-compatibility/2006" xmlns:p14="http://schemas.microsoft.com/office/powerpoint/2010/main">
+    <mc:Choice Requires="p14">
       <p:transition spd="slow" p14:dur="2000" advTm="92152"/>
     </mc:Choice>
-    <mc:Fallback>
+    <mc:Fallback xmlns="">
       <p:transition spd="slow" advTm="92152"/>
     </mc:Fallback>
   </mc:AlternateContent>
@@ -10191,14 +11708,14 @@
           </a:ln>
           <a:extLst>
             <a:ext uri="{909E8E84-426E-40dd-AFC4-6F175D3DCCD1}">
-              <a14:hiddenFill xmlns="" xmlns:a14="http://schemas.microsoft.com/office/drawing/2010/main">
+              <a14:hiddenFill xmlns:a14="http://schemas.microsoft.com/office/drawing/2010/main" xmlns="">
                 <a:solidFill>
                   <a:srgbClr val="FFFFFF"/>
                 </a:solidFill>
               </a14:hiddenFill>
             </a:ext>
             <a:ext uri="{91240B29-F687-4f45-9708-019B960494DF}">
-              <a14:hiddenLine xmlns="" xmlns:a14="http://schemas.microsoft.com/office/drawing/2010/main" w="12700" cap="flat">
+              <a14:hiddenLine xmlns:a14="http://schemas.microsoft.com/office/drawing/2010/main" xmlns="" w="12700" cap="flat">
                 <a:solidFill>
                   <a:schemeClr val="tx1"/>
                 </a:solidFill>
@@ -10242,14 +11759,14 @@
           </a:ln>
           <a:extLst>
             <a:ext uri="{909E8E84-426E-40dd-AFC4-6F175D3DCCD1}">
-              <a14:hiddenFill xmlns="" xmlns:a14="http://schemas.microsoft.com/office/drawing/2010/main">
+              <a14:hiddenFill xmlns:a14="http://schemas.microsoft.com/office/drawing/2010/main" xmlns="">
                 <a:solidFill>
                   <a:srgbClr val="FFFFFF"/>
                 </a:solidFill>
               </a14:hiddenFill>
             </a:ext>
             <a:ext uri="{91240B29-F687-4f45-9708-019B960494DF}">
-              <a14:hiddenLine xmlns="" xmlns:a14="http://schemas.microsoft.com/office/drawing/2010/main" w="12700" cap="flat">
+              <a14:hiddenLine xmlns:a14="http://schemas.microsoft.com/office/drawing/2010/main" xmlns="" w="12700" cap="flat">
                 <a:solidFill>
                   <a:schemeClr val="tx1"/>
                 </a:solidFill>
@@ -10477,11 +11994,11 @@
   <p:clrMapOvr>
     <a:masterClrMapping/>
   </p:clrMapOvr>
-  <mc:AlternateContent xmlns:mc="http://schemas.openxmlformats.org/markup-compatibility/2006">
-    <mc:Choice xmlns:p14="http://schemas.microsoft.com/office/powerpoint/2010/main" Requires="p14">
+  <mc:AlternateContent xmlns:mc="http://schemas.openxmlformats.org/markup-compatibility/2006" xmlns:p14="http://schemas.microsoft.com/office/powerpoint/2010/main">
+    <mc:Choice Requires="p14">
       <p:transition spd="slow" p14:dur="2000" advTm="92152"/>
     </mc:Choice>
-    <mc:Fallback>
+    <mc:Fallback xmlns="">
       <p:transition spd="slow" advTm="92152"/>
     </mc:Fallback>
   </mc:AlternateContent>
@@ -10527,14 +12044,14 @@
           </a:ln>
           <a:extLst>
             <a:ext uri="{909E8E84-426E-40dd-AFC4-6F175D3DCCD1}">
-              <a14:hiddenFill xmlns:a14="http://schemas.microsoft.com/office/drawing/2010/main" xmlns="">
+              <a14:hiddenFill xmlns="" xmlns:a14="http://schemas.microsoft.com/office/drawing/2010/main">
                 <a:solidFill>
                   <a:srgbClr val="FFFFFF"/>
                 </a:solidFill>
               </a14:hiddenFill>
             </a:ext>
             <a:ext uri="{91240B29-F687-4f45-9708-019B960494DF}">
-              <a14:hiddenLine xmlns:a14="http://schemas.microsoft.com/office/drawing/2010/main" xmlns="" w="12700" cap="flat">
+              <a14:hiddenLine xmlns="" xmlns:a14="http://schemas.microsoft.com/office/drawing/2010/main" w="12700" cap="flat">
                 <a:solidFill>
                   <a:schemeClr val="tx1"/>
                 </a:solidFill>
@@ -10578,14 +12095,14 @@
           </a:ln>
           <a:extLst>
             <a:ext uri="{909E8E84-426E-40dd-AFC4-6F175D3DCCD1}">
-              <a14:hiddenFill xmlns:a14="http://schemas.microsoft.com/office/drawing/2010/main" xmlns="">
+              <a14:hiddenFill xmlns="" xmlns:a14="http://schemas.microsoft.com/office/drawing/2010/main">
                 <a:solidFill>
                   <a:srgbClr val="FFFFFF"/>
                 </a:solidFill>
               </a14:hiddenFill>
             </a:ext>
             <a:ext uri="{91240B29-F687-4f45-9708-019B960494DF}">
-              <a14:hiddenLine xmlns:a14="http://schemas.microsoft.com/office/drawing/2010/main" xmlns="" w="12700" cap="flat">
+              <a14:hiddenLine xmlns="" xmlns:a14="http://schemas.microsoft.com/office/drawing/2010/main" w="12700" cap="flat">
                 <a:solidFill>
                   <a:schemeClr val="tx1"/>
                 </a:solidFill>
@@ -10883,11 +12400,11 @@
   <p:clrMapOvr>
     <a:masterClrMapping/>
   </p:clrMapOvr>
-  <mc:AlternateContent xmlns:mc="http://schemas.openxmlformats.org/markup-compatibility/2006">
-    <mc:Choice xmlns:p14="http://schemas.microsoft.com/office/powerpoint/2010/main" Requires="p14">
+  <mc:AlternateContent xmlns:mc="http://schemas.openxmlformats.org/markup-compatibility/2006" xmlns:p14="http://schemas.microsoft.com/office/powerpoint/2010/main">
+    <mc:Choice Requires="p14">
       <p:transition spd="slow" p14:dur="2000" advTm="92152"/>
     </mc:Choice>
-    <mc:Fallback>
+    <mc:Fallback xmlns="">
       <p:transition spd="slow" advTm="92152"/>
     </mc:Fallback>
   </mc:AlternateContent>
@@ -10933,14 +12450,14 @@
           </a:ln>
           <a:extLst>
             <a:ext uri="{909E8E84-426E-40dd-AFC4-6F175D3DCCD1}">
-              <a14:hiddenFill xmlns="" xmlns:a14="http://schemas.microsoft.com/office/drawing/2010/main">
+              <a14:hiddenFill xmlns:a14="http://schemas.microsoft.com/office/drawing/2010/main" xmlns="">
                 <a:solidFill>
                   <a:srgbClr val="FFFFFF"/>
                 </a:solidFill>
               </a14:hiddenFill>
             </a:ext>
             <a:ext uri="{91240B29-F687-4f45-9708-019B960494DF}">
-              <a14:hiddenLine xmlns="" xmlns:a14="http://schemas.microsoft.com/office/drawing/2010/main" w="12700" cap="flat">
+              <a14:hiddenLine xmlns:a14="http://schemas.microsoft.com/office/drawing/2010/main" xmlns="" w="12700" cap="flat">
                 <a:solidFill>
                   <a:schemeClr val="tx1"/>
                 </a:solidFill>
@@ -10984,14 +12501,14 @@
           </a:ln>
           <a:extLst>
             <a:ext uri="{909E8E84-426E-40dd-AFC4-6F175D3DCCD1}">
-              <a14:hiddenFill xmlns="" xmlns:a14="http://schemas.microsoft.com/office/drawing/2010/main">
+              <a14:hiddenFill xmlns:a14="http://schemas.microsoft.com/office/drawing/2010/main" xmlns="">
                 <a:solidFill>
                   <a:srgbClr val="FFFFFF"/>
                 </a:solidFill>
               </a14:hiddenFill>
             </a:ext>
             <a:ext uri="{91240B29-F687-4f45-9708-019B960494DF}">
-              <a14:hiddenLine xmlns="" xmlns:a14="http://schemas.microsoft.com/office/drawing/2010/main" w="12700" cap="flat">
+              <a14:hiddenLine xmlns:a14="http://schemas.microsoft.com/office/drawing/2010/main" xmlns="" w="12700" cap="flat">
                 <a:solidFill>
                   <a:schemeClr val="tx1"/>
                 </a:solidFill>
@@ -11153,11 +12670,11 @@
   <p:clrMapOvr>
     <a:masterClrMapping/>
   </p:clrMapOvr>
-  <mc:AlternateContent xmlns:mc="http://schemas.openxmlformats.org/markup-compatibility/2006">
-    <mc:Choice xmlns:p14="http://schemas.microsoft.com/office/powerpoint/2010/main" Requires="p14">
+  <mc:AlternateContent xmlns:mc="http://schemas.openxmlformats.org/markup-compatibility/2006" xmlns:p14="http://schemas.microsoft.com/office/powerpoint/2010/main">
+    <mc:Choice Requires="p14">
       <p:transition spd="slow" p14:dur="2000" advTm="92152"/>
     </mc:Choice>
-    <mc:Fallback>
+    <mc:Fallback xmlns="">
       <p:transition spd="slow" advTm="92152"/>
     </mc:Fallback>
   </mc:AlternateContent>
@@ -11203,14 +12720,14 @@
           </a:ln>
           <a:extLst>
             <a:ext uri="{909E8E84-426E-40dd-AFC4-6F175D3DCCD1}">
-              <a14:hiddenFill xmlns:a14="http://schemas.microsoft.com/office/drawing/2010/main" xmlns="">
+              <a14:hiddenFill xmlns="" xmlns:a14="http://schemas.microsoft.com/office/drawing/2010/main">
                 <a:solidFill>
                   <a:srgbClr val="FFFFFF"/>
                 </a:solidFill>
               </a14:hiddenFill>
             </a:ext>
             <a:ext uri="{91240B29-F687-4f45-9708-019B960494DF}">
-              <a14:hiddenLine xmlns:a14="http://schemas.microsoft.com/office/drawing/2010/main" xmlns="" w="12700" cap="flat">
+              <a14:hiddenLine xmlns="" xmlns:a14="http://schemas.microsoft.com/office/drawing/2010/main" w="12700" cap="flat">
                 <a:solidFill>
                   <a:schemeClr val="tx1"/>
                 </a:solidFill>
@@ -11254,14 +12771,14 @@
           </a:ln>
           <a:extLst>
             <a:ext uri="{909E8E84-426E-40dd-AFC4-6F175D3DCCD1}">
-              <a14:hiddenFill xmlns:a14="http://schemas.microsoft.com/office/drawing/2010/main" xmlns="">
+              <a14:hiddenFill xmlns="" xmlns:a14="http://schemas.microsoft.com/office/drawing/2010/main">
                 <a:solidFill>
                   <a:srgbClr val="FFFFFF"/>
                 </a:solidFill>
               </a14:hiddenFill>
             </a:ext>
             <a:ext uri="{91240B29-F687-4f45-9708-019B960494DF}">
-              <a14:hiddenLine xmlns:a14="http://schemas.microsoft.com/office/drawing/2010/main" xmlns="" w="12700" cap="flat">
+              <a14:hiddenLine xmlns="" xmlns:a14="http://schemas.microsoft.com/office/drawing/2010/main" w="12700" cap="flat">
                 <a:solidFill>
                   <a:schemeClr val="tx1"/>
                 </a:solidFill>
@@ -11302,8 +12819,8 @@
         </p:nvSpPr>
         <p:spPr>
           <a:xfrm>
-            <a:off x="1122017" y="219808"/>
-            <a:ext cx="7647210" cy="538475"/>
+            <a:off x="1122018" y="219808"/>
+            <a:ext cx="7647210" cy="638313"/>
           </a:xfrm>
         </p:spPr>
         <p:txBody>
@@ -11312,7 +12829,7 @@
           <a:p>
             <a:r>
               <a:rPr lang="en-US" dirty="0"/>
-              <a:t>Kubernetes API structure</a:t>
+              <a:t>Requests to API Server</a:t>
             </a:r>
           </a:p>
         </p:txBody>
@@ -11347,43 +12864,90 @@
           </a:prstGeom>
         </p:spPr>
       </p:pic>
-      <p:pic>
-        <p:nvPicPr>
-          <p:cNvPr id="3" name="Picture 2" descr="A diagram of a software company&#10;&#10;Description automatically generated">
+      <p:sp>
+        <p:nvSpPr>
+          <p:cNvPr id="3" name="TextBox 2">
             <a:extLst>
               <a:ext uri="{FF2B5EF4-FFF2-40B4-BE49-F238E27FC236}">
-                <a16:creationId xmlns:a16="http://schemas.microsoft.com/office/drawing/2014/main" id="{97B7A28C-1AA9-C9CF-FBDD-E390A462B055}"/>
+                <a16:creationId xmlns:a16="http://schemas.microsoft.com/office/drawing/2014/main" id="{01DFFC6A-AD3B-B8A5-A033-3135B2B7D9B6}"/>
               </a:ext>
             </a:extLst>
           </p:cNvPr>
-          <p:cNvPicPr>
-            <a:picLocks noChangeAspect="1"/>
-          </p:cNvPicPr>
+          <p:cNvSpPr txBox="1"/>
           <p:nvPr/>
-        </p:nvPicPr>
-        <p:blipFill>
-          <a:blip r:embed="rId5"/>
-          <a:stretch>
-            <a:fillRect/>
-          </a:stretch>
-        </p:blipFill>
-        <p:spPr>
-          <a:xfrm>
-            <a:off x="1502797" y="763324"/>
-            <a:ext cx="5216055" cy="3951799"/>
+        </p:nvSpPr>
+        <p:spPr>
+          <a:xfrm>
+            <a:off x="890546" y="1781092"/>
+            <a:ext cx="3752950" cy="1200329"/>
           </a:xfrm>
           <a:prstGeom prst="rect">
             <a:avLst/>
           </a:prstGeom>
-        </p:spPr>
-      </p:pic>
+          <a:noFill/>
+        </p:spPr>
+        <p:txBody>
+          <a:bodyPr wrap="none" rtlCol="0">
+            <a:spAutoFit/>
+          </a:bodyPr>
+          <a:lstStyle/>
+          <a:p>
+            <a:r>
+              <a:rPr lang="en-US" sz="2400" dirty="0" err="1">
+                <a:latin typeface="Consolas" panose="020B0609020204030204" pitchFamily="49" charset="0"/>
+                <a:cs typeface="Consolas" panose="020B0609020204030204" pitchFamily="49" charset="0"/>
+              </a:rPr>
+              <a:t>kubectl</a:t>
+            </a:r>
+            <a:r>
+              <a:rPr lang="en-US" sz="2400" dirty="0">
+                <a:latin typeface="Consolas" panose="020B0609020204030204" pitchFamily="49" charset="0"/>
+                <a:cs typeface="Consolas" panose="020B0609020204030204" pitchFamily="49" charset="0"/>
+              </a:rPr>
+              <a:t> get pods –v 6</a:t>
+            </a:r>
+          </a:p>
+          <a:p>
+            <a:r>
+              <a:rPr lang="en-US" sz="2400" dirty="0" err="1">
+                <a:latin typeface="Consolas" panose="020B0609020204030204" pitchFamily="49" charset="0"/>
+                <a:cs typeface="Consolas" panose="020B0609020204030204" pitchFamily="49" charset="0"/>
+              </a:rPr>
+              <a:t>kubectl</a:t>
+            </a:r>
+            <a:r>
+              <a:rPr lang="en-US" sz="2400" dirty="0">
+                <a:latin typeface="Consolas" panose="020B0609020204030204" pitchFamily="49" charset="0"/>
+                <a:cs typeface="Consolas" panose="020B0609020204030204" pitchFamily="49" charset="0"/>
+              </a:rPr>
+              <a:t> proxy</a:t>
+            </a:r>
+          </a:p>
+          <a:p>
+            <a:r>
+              <a:rPr lang="en-US" sz="2400" dirty="0" err="1">
+                <a:latin typeface="Consolas" panose="020B0609020204030204" pitchFamily="49" charset="0"/>
+                <a:cs typeface="Consolas" panose="020B0609020204030204" pitchFamily="49" charset="0"/>
+              </a:rPr>
+              <a:t>Kubectl</a:t>
+            </a:r>
+            <a:r>
+              <a:rPr lang="en-US" sz="2400" dirty="0">
+                <a:latin typeface="Consolas" panose="020B0609020204030204" pitchFamily="49" charset="0"/>
+                <a:cs typeface="Consolas" panose="020B0609020204030204" pitchFamily="49" charset="0"/>
+              </a:rPr>
+              <a:t> get --raw </a:t>
+            </a:r>
+          </a:p>
+        </p:txBody>
+      </p:sp>
     </p:spTree>
     <p:custDataLst>
       <p:tags r:id="rId1"/>
     </p:custDataLst>
     <p:extLst>
       <p:ext uri="{BB962C8B-B14F-4D97-AF65-F5344CB8AC3E}">
-        <p14:creationId xmlns:p14="http://schemas.microsoft.com/office/powerpoint/2010/main" val="1788487107"/>
+        <p14:creationId xmlns:p14="http://schemas.microsoft.com/office/powerpoint/2010/main" val="55607257"/>
       </p:ext>
     </p:extLst>
   </p:cSld>
@@ -11521,6 +13085,39 @@
           </a:p>
         </p:txBody>
       </p:sp>
+      <p:sp>
+        <p:nvSpPr>
+          <p:cNvPr id="15" name="Title 14">
+            <a:extLst>
+              <a:ext uri="{FF2B5EF4-FFF2-40B4-BE49-F238E27FC236}">
+                <a16:creationId xmlns:a16="http://schemas.microsoft.com/office/drawing/2014/main" id="{AC70AFF7-D39C-1B45-8E56-844E670FBDCF}"/>
+              </a:ext>
+            </a:extLst>
+          </p:cNvPr>
+          <p:cNvSpPr>
+            <a:spLocks noGrp="1"/>
+          </p:cNvSpPr>
+          <p:nvPr>
+            <p:ph type="title"/>
+          </p:nvPr>
+        </p:nvSpPr>
+        <p:spPr>
+          <a:xfrm>
+            <a:off x="1122017" y="219808"/>
+            <a:ext cx="7647210" cy="538475"/>
+          </a:xfrm>
+        </p:spPr>
+        <p:txBody>
+          <a:bodyPr/>
+          <a:lstStyle/>
+          <a:p>
+            <a:r>
+              <a:rPr lang="en-US" dirty="0"/>
+              <a:t>Kubernetes API structure</a:t>
+            </a:r>
+          </a:p>
+        </p:txBody>
+      </p:sp>
       <p:pic>
         <p:nvPicPr>
           <p:cNvPr id="4" name="Picture 3" descr="A blue hexagon with white and blue gears&#10;&#10;Description automatically generated">
@@ -11543,7 +13140,7 @@
         </p:blipFill>
         <p:spPr>
           <a:xfrm>
-            <a:off x="2636485" y="1659592"/>
+            <a:off x="309217" y="172437"/>
             <a:ext cx="812800" cy="787400"/>
           </a:xfrm>
           <a:prstGeom prst="rect">
@@ -11551,48 +13148,743 @@
           </a:prstGeom>
         </p:spPr>
       </p:pic>
-      <p:sp>
-        <p:nvSpPr>
-          <p:cNvPr id="2" name="TextBox 1">
+      <p:pic>
+        <p:nvPicPr>
+          <p:cNvPr id="3" name="Picture 2" descr="A diagram of a software company&#10;&#10;Description automatically generated">
             <a:extLst>
               <a:ext uri="{FF2B5EF4-FFF2-40B4-BE49-F238E27FC236}">
-                <a16:creationId xmlns:a16="http://schemas.microsoft.com/office/drawing/2014/main" id="{0A1C82F2-FD3D-4DDB-6D43-D9AD5ACAFF63}"/>
+                <a16:creationId xmlns:a16="http://schemas.microsoft.com/office/drawing/2014/main" id="{97B7A28C-1AA9-C9CF-FBDD-E390A462B055}"/>
               </a:ext>
             </a:extLst>
           </p:cNvPr>
-          <p:cNvSpPr txBox="1"/>
+          <p:cNvPicPr>
+            <a:picLocks noChangeAspect="1"/>
+          </p:cNvPicPr>
           <p:nvPr/>
-        </p:nvSpPr>
-        <p:spPr>
-          <a:xfrm>
-            <a:off x="3776564" y="1822459"/>
-            <a:ext cx="3076412" cy="646331"/>
+        </p:nvPicPr>
+        <p:blipFill>
+          <a:blip r:embed="rId5"/>
+          <a:stretch>
+            <a:fillRect/>
+          </a:stretch>
+        </p:blipFill>
+        <p:spPr>
+          <a:xfrm>
+            <a:off x="1502797" y="763324"/>
+            <a:ext cx="5216055" cy="3951799"/>
           </a:xfrm>
           <a:prstGeom prst="rect">
             <a:avLst/>
           </a:prstGeom>
-          <a:noFill/>
-        </p:spPr>
-        <p:txBody>
-          <a:bodyPr wrap="square" rtlCol="0">
-            <a:spAutoFit/>
-          </a:bodyPr>
-          <a:lstStyle/>
-          <a:p>
-            <a:r>
-              <a:rPr lang="en-US" sz="3600" dirty="0"/>
-              <a:t>Questions?</a:t>
-            </a:r>
-          </a:p>
-        </p:txBody>
-      </p:sp>
+        </p:spPr>
+      </p:pic>
     </p:spTree>
     <p:custDataLst>
       <p:tags r:id="rId1"/>
     </p:custDataLst>
     <p:extLst>
       <p:ext uri="{BB962C8B-B14F-4D97-AF65-F5344CB8AC3E}">
-        <p14:creationId xmlns:p14="http://schemas.microsoft.com/office/powerpoint/2010/main" val="1055841147"/>
+        <p14:creationId xmlns:p14="http://schemas.microsoft.com/office/powerpoint/2010/main" val="1788487107"/>
+      </p:ext>
+    </p:extLst>
+  </p:cSld>
+  <p:clrMapOvr>
+    <a:masterClrMapping/>
+  </p:clrMapOvr>
+  <mc:AlternateContent xmlns:mc="http://schemas.openxmlformats.org/markup-compatibility/2006" xmlns:p14="http://schemas.microsoft.com/office/powerpoint/2010/main">
+    <mc:Choice Requires="p14">
+      <p:transition spd="slow" p14:dur="2000" advTm="92152"/>
+    </mc:Choice>
+    <mc:Fallback xmlns="">
+      <p:transition spd="slow" advTm="92152"/>
+    </mc:Fallback>
+  </mc:AlternateContent>
+</p:sld>
+</file>
+
+<file path=ppt/slides/slide9.xml><?xml version="1.0" encoding="utf-8"?>
+<p:sld xmlns:a="http://schemas.openxmlformats.org/drawingml/2006/main" xmlns:r="http://schemas.openxmlformats.org/officeDocument/2006/relationships" xmlns:p="http://schemas.openxmlformats.org/presentationml/2006/main">
+  <p:cSld>
+    <p:spTree>
+      <p:nvGrpSpPr>
+        <p:cNvPr id="1" name=""/>
+        <p:cNvGrpSpPr/>
+        <p:nvPr/>
+      </p:nvGrpSpPr>
+      <p:grpSpPr>
+        <a:xfrm>
+          <a:off x="0" y="0"/>
+          <a:ext cx="0" cy="0"/>
+          <a:chOff x="0" y="0"/>
+          <a:chExt cx="0" cy="0"/>
+        </a:xfrm>
+      </p:grpSpPr>
+      <p:sp>
+        <p:nvSpPr>
+          <p:cNvPr id="12" name="Rectangle 7"/>
+          <p:cNvSpPr>
+            <a:spLocks/>
+          </p:cNvSpPr>
+          <p:nvPr/>
+        </p:nvSpPr>
+        <p:spPr bwMode="auto">
+          <a:xfrm>
+            <a:off x="715617" y="1582532"/>
+            <a:ext cx="3368348" cy="2565067"/>
+          </a:xfrm>
+          <a:prstGeom prst="rect">
+            <a:avLst/>
+          </a:prstGeom>
+          <a:noFill/>
+          <a:ln>
+            <a:noFill/>
+          </a:ln>
+          <a:extLst>
+            <a:ext uri="{909E8E84-426E-40dd-AFC4-6F175D3DCCD1}">
+              <a14:hiddenFill xmlns:a14="http://schemas.microsoft.com/office/drawing/2010/main" xmlns="">
+                <a:solidFill>
+                  <a:srgbClr val="FFFFFF"/>
+                </a:solidFill>
+              </a14:hiddenFill>
+            </a:ext>
+            <a:ext uri="{91240B29-F687-4f45-9708-019B960494DF}">
+              <a14:hiddenLine xmlns:a14="http://schemas.microsoft.com/office/drawing/2010/main" xmlns="" w="12700" cap="flat">
+                <a:solidFill>
+                  <a:schemeClr val="tx1"/>
+                </a:solidFill>
+                <a:miter lim="800000"/>
+                <a:headEnd type="none" w="med" len="med"/>
+                <a:tailEnd type="none" w="med" len="med"/>
+              </a14:hiddenLine>
+            </a:ext>
+          </a:extLst>
+        </p:spPr>
+        <p:txBody>
+          <a:bodyPr lIns="0" tIns="0" rIns="0" bIns="0" anchor="t"/>
+          <a:lstStyle/>
+          <a:p>
+            <a:endParaRPr lang="en-US" sz="1800" dirty="0">
+              <a:ea typeface="ＭＳ Ｐゴシック" charset="0"/>
+              <a:sym typeface="Lato Light" charset="0"/>
+            </a:endParaRPr>
+          </a:p>
+        </p:txBody>
+      </p:sp>
+      <p:sp>
+        <p:nvSpPr>
+          <p:cNvPr id="24" name="Rectangle 7"/>
+          <p:cNvSpPr>
+            <a:spLocks/>
+          </p:cNvSpPr>
+          <p:nvPr/>
+        </p:nvSpPr>
+        <p:spPr bwMode="auto">
+          <a:xfrm>
+            <a:off x="5171902" y="1456376"/>
+            <a:ext cx="3256481" cy="2834318"/>
+          </a:xfrm>
+          <a:prstGeom prst="rect">
+            <a:avLst/>
+          </a:prstGeom>
+          <a:noFill/>
+          <a:ln>
+            <a:noFill/>
+          </a:ln>
+          <a:extLst>
+            <a:ext uri="{909E8E84-426E-40dd-AFC4-6F175D3DCCD1}">
+              <a14:hiddenFill xmlns:a14="http://schemas.microsoft.com/office/drawing/2010/main" xmlns="">
+                <a:solidFill>
+                  <a:srgbClr val="FFFFFF"/>
+                </a:solidFill>
+              </a14:hiddenFill>
+            </a:ext>
+            <a:ext uri="{91240B29-F687-4f45-9708-019B960494DF}">
+              <a14:hiddenLine xmlns:a14="http://schemas.microsoft.com/office/drawing/2010/main" xmlns="" w="12700" cap="flat">
+                <a:solidFill>
+                  <a:schemeClr val="tx1"/>
+                </a:solidFill>
+                <a:miter lim="800000"/>
+                <a:headEnd type="none" w="med" len="med"/>
+                <a:tailEnd type="none" w="med" len="med"/>
+              </a14:hiddenLine>
+            </a:ext>
+          </a:extLst>
+        </p:spPr>
+        <p:txBody>
+          <a:bodyPr lIns="0" tIns="0" rIns="0" bIns="0" anchor="t"/>
+          <a:lstStyle/>
+          <a:p>
+            <a:endParaRPr lang="en-US" sz="1800" dirty="0">
+              <a:ea typeface="ＭＳ Ｐゴシック" charset="0"/>
+              <a:cs typeface="Lato Light" charset="0"/>
+              <a:sym typeface="Lato Light" charset="0"/>
+            </a:endParaRPr>
+          </a:p>
+        </p:txBody>
+      </p:sp>
+      <p:sp>
+        <p:nvSpPr>
+          <p:cNvPr id="15" name="Title 14">
+            <a:extLst>
+              <a:ext uri="{FF2B5EF4-FFF2-40B4-BE49-F238E27FC236}">
+                <a16:creationId xmlns:a16="http://schemas.microsoft.com/office/drawing/2014/main" id="{AC70AFF7-D39C-1B45-8E56-844E670FBDCF}"/>
+              </a:ext>
+            </a:extLst>
+          </p:cNvPr>
+          <p:cNvSpPr>
+            <a:spLocks noGrp="1"/>
+          </p:cNvSpPr>
+          <p:nvPr>
+            <p:ph type="title"/>
+          </p:nvPr>
+        </p:nvSpPr>
+        <p:spPr>
+          <a:xfrm>
+            <a:off x="1122018" y="219808"/>
+            <a:ext cx="7647210" cy="638313"/>
+          </a:xfrm>
+        </p:spPr>
+        <p:txBody>
+          <a:bodyPr/>
+          <a:lstStyle/>
+          <a:p>
+            <a:r>
+              <a:rPr lang="en-US" dirty="0" err="1"/>
+              <a:t>APIService</a:t>
+            </a:r>
+            <a:endParaRPr lang="en-US" dirty="0"/>
+          </a:p>
+        </p:txBody>
+      </p:sp>
+      <p:pic>
+        <p:nvPicPr>
+          <p:cNvPr id="4" name="Picture 3" descr="A blue hexagon with white and blue gears&#10;&#10;Description automatically generated">
+            <a:extLst>
+              <a:ext uri="{FF2B5EF4-FFF2-40B4-BE49-F238E27FC236}">
+                <a16:creationId xmlns:a16="http://schemas.microsoft.com/office/drawing/2014/main" id="{E3D5D9D7-1E4A-870B-BEC3-4F2878358332}"/>
+              </a:ext>
+            </a:extLst>
+          </p:cNvPr>
+          <p:cNvPicPr>
+            <a:picLocks noChangeAspect="1"/>
+          </p:cNvPicPr>
+          <p:nvPr/>
+        </p:nvPicPr>
+        <p:blipFill>
+          <a:blip r:embed="rId4"/>
+          <a:stretch>
+            <a:fillRect/>
+          </a:stretch>
+        </p:blipFill>
+        <p:spPr>
+          <a:xfrm>
+            <a:off x="309217" y="172437"/>
+            <a:ext cx="812800" cy="787400"/>
+          </a:xfrm>
+          <a:prstGeom prst="rect">
+            <a:avLst/>
+          </a:prstGeom>
+        </p:spPr>
+      </p:pic>
+      <p:sp>
+        <p:nvSpPr>
+          <p:cNvPr id="3" name="TextBox 2">
+            <a:extLst>
+              <a:ext uri="{FF2B5EF4-FFF2-40B4-BE49-F238E27FC236}">
+                <a16:creationId xmlns:a16="http://schemas.microsoft.com/office/drawing/2014/main" id="{01DFFC6A-AD3B-B8A5-A033-3135B2B7D9B6}"/>
+              </a:ext>
+            </a:extLst>
+          </p:cNvPr>
+          <p:cNvSpPr txBox="1"/>
+          <p:nvPr/>
+        </p:nvSpPr>
+        <p:spPr>
+          <a:xfrm>
+            <a:off x="866692" y="1007208"/>
+            <a:ext cx="5597718" cy="4031873"/>
+          </a:xfrm>
+          <a:prstGeom prst="rect">
+            <a:avLst/>
+          </a:prstGeom>
+          <a:noFill/>
+        </p:spPr>
+        <p:txBody>
+          <a:bodyPr wrap="square" rtlCol="0">
+            <a:spAutoFit/>
+          </a:bodyPr>
+          <a:lstStyle/>
+          <a:p>
+            <a:r>
+              <a:rPr lang="en-US" sz="1600" dirty="0" err="1">
+                <a:solidFill>
+                  <a:srgbClr val="CC7832"/>
+                </a:solidFill>
+                <a:effectLst/>
+              </a:rPr>
+              <a:t>apiVersion</a:t>
+            </a:r>
+            <a:r>
+              <a:rPr lang="en-US" sz="1600" dirty="0">
+                <a:solidFill>
+                  <a:srgbClr val="A9B7C6"/>
+                </a:solidFill>
+                <a:effectLst/>
+              </a:rPr>
+              <a:t>: apiregistration.k8s.io/v1</a:t>
+            </a:r>
+            <a:br>
+              <a:rPr lang="en-US" sz="1600" dirty="0">
+                <a:solidFill>
+                  <a:srgbClr val="A9B7C6"/>
+                </a:solidFill>
+                <a:effectLst/>
+              </a:rPr>
+            </a:br>
+            <a:r>
+              <a:rPr lang="en-US" sz="1600" dirty="0">
+                <a:solidFill>
+                  <a:srgbClr val="CC7832"/>
+                </a:solidFill>
+                <a:effectLst/>
+              </a:rPr>
+              <a:t>kind</a:t>
+            </a:r>
+            <a:r>
+              <a:rPr lang="en-US" sz="1600" dirty="0">
+                <a:solidFill>
+                  <a:srgbClr val="A9B7C6"/>
+                </a:solidFill>
+                <a:effectLst/>
+              </a:rPr>
+              <a:t>: </a:t>
+            </a:r>
+            <a:r>
+              <a:rPr lang="en-US" sz="1600" dirty="0" err="1">
+                <a:solidFill>
+                  <a:srgbClr val="A9B7C6"/>
+                </a:solidFill>
+                <a:effectLst/>
+              </a:rPr>
+              <a:t>APIService</a:t>
+            </a:r>
+            <a:br>
+              <a:rPr lang="en-US" sz="1600" dirty="0">
+                <a:solidFill>
+                  <a:srgbClr val="A9B7C6"/>
+                </a:solidFill>
+                <a:effectLst/>
+              </a:rPr>
+            </a:br>
+            <a:r>
+              <a:rPr lang="en-US" sz="1600" dirty="0">
+                <a:solidFill>
+                  <a:srgbClr val="CC7832"/>
+                </a:solidFill>
+                <a:effectLst/>
+              </a:rPr>
+              <a:t>metadata</a:t>
+            </a:r>
+            <a:r>
+              <a:rPr lang="en-US" sz="1600" dirty="0">
+                <a:solidFill>
+                  <a:srgbClr val="A9B7C6"/>
+                </a:solidFill>
+                <a:effectLst/>
+              </a:rPr>
+              <a:t>:</a:t>
+            </a:r>
+            <a:br>
+              <a:rPr lang="en-US" sz="1600" dirty="0">
+                <a:solidFill>
+                  <a:srgbClr val="A9B7C6"/>
+                </a:solidFill>
+                <a:effectLst/>
+              </a:rPr>
+            </a:br>
+            <a:r>
+              <a:rPr lang="en-US" sz="1600" dirty="0">
+                <a:solidFill>
+                  <a:srgbClr val="A9B7C6"/>
+                </a:solidFill>
+                <a:effectLst/>
+              </a:rPr>
+              <a:t>  </a:t>
+            </a:r>
+            <a:r>
+              <a:rPr lang="en-US" sz="1600" dirty="0">
+                <a:solidFill>
+                  <a:srgbClr val="CC7832"/>
+                </a:solidFill>
+                <a:effectLst/>
+              </a:rPr>
+              <a:t>name</a:t>
+            </a:r>
+            <a:r>
+              <a:rPr lang="en-US" sz="1600" dirty="0">
+                <a:solidFill>
+                  <a:srgbClr val="A9B7C6"/>
+                </a:solidFill>
+                <a:effectLst/>
+              </a:rPr>
+              <a:t>: v1alpha1.example.com</a:t>
+            </a:r>
+            <a:br>
+              <a:rPr lang="en-US" sz="1600" dirty="0">
+                <a:solidFill>
+                  <a:srgbClr val="A9B7C6"/>
+                </a:solidFill>
+                <a:effectLst/>
+              </a:rPr>
+            </a:br>
+            <a:r>
+              <a:rPr lang="en-US" sz="1600" dirty="0">
+                <a:solidFill>
+                  <a:srgbClr val="CC7832"/>
+                </a:solidFill>
+                <a:effectLst/>
+              </a:rPr>
+              <a:t>spec</a:t>
+            </a:r>
+            <a:r>
+              <a:rPr lang="en-US" sz="1600" dirty="0">
+                <a:solidFill>
+                  <a:srgbClr val="A9B7C6"/>
+                </a:solidFill>
+                <a:effectLst/>
+              </a:rPr>
+              <a:t>:</a:t>
+            </a:r>
+            <a:br>
+              <a:rPr lang="en-US" sz="1600" dirty="0">
+                <a:solidFill>
+                  <a:srgbClr val="A9B7C6"/>
+                </a:solidFill>
+                <a:effectLst/>
+              </a:rPr>
+            </a:br>
+            <a:r>
+              <a:rPr lang="en-US" sz="1600" dirty="0">
+                <a:solidFill>
+                  <a:srgbClr val="A9B7C6"/>
+                </a:solidFill>
+                <a:effectLst/>
+              </a:rPr>
+              <a:t>  </a:t>
+            </a:r>
+            <a:r>
+              <a:rPr lang="en-US" sz="1600" dirty="0">
+                <a:solidFill>
+                  <a:srgbClr val="CC7832"/>
+                </a:solidFill>
+                <a:effectLst/>
+              </a:rPr>
+              <a:t>service</a:t>
+            </a:r>
+            <a:r>
+              <a:rPr lang="en-US" sz="1600" dirty="0">
+                <a:solidFill>
+                  <a:srgbClr val="A9B7C6"/>
+                </a:solidFill>
+                <a:effectLst/>
+              </a:rPr>
+              <a:t>:</a:t>
+            </a:r>
+            <a:br>
+              <a:rPr lang="en-US" sz="1600" dirty="0">
+                <a:solidFill>
+                  <a:srgbClr val="A9B7C6"/>
+                </a:solidFill>
+                <a:effectLst/>
+              </a:rPr>
+            </a:br>
+            <a:r>
+              <a:rPr lang="en-US" sz="1600" dirty="0">
+                <a:solidFill>
+                  <a:srgbClr val="A9B7C6"/>
+                </a:solidFill>
+                <a:effectLst/>
+              </a:rPr>
+              <a:t>    </a:t>
+            </a:r>
+            <a:r>
+              <a:rPr lang="en-US" sz="1600" dirty="0">
+                <a:solidFill>
+                  <a:srgbClr val="CC7832"/>
+                </a:solidFill>
+                <a:effectLst/>
+              </a:rPr>
+              <a:t>name</a:t>
+            </a:r>
+            <a:r>
+              <a:rPr lang="en-US" sz="1600" dirty="0">
+                <a:solidFill>
+                  <a:srgbClr val="A9B7C6"/>
+                </a:solidFill>
+                <a:effectLst/>
+              </a:rPr>
+              <a:t>: </a:t>
+            </a:r>
+            <a:r>
+              <a:rPr lang="en-US" sz="1600" dirty="0" err="1">
+                <a:solidFill>
+                  <a:srgbClr val="A9B7C6"/>
+                </a:solidFill>
+                <a:effectLst/>
+              </a:rPr>
+              <a:t>api</a:t>
+            </a:r>
+            <a:r>
+              <a:rPr lang="en-US" sz="1600" dirty="0">
+                <a:solidFill>
+                  <a:srgbClr val="A9B7C6"/>
+                </a:solidFill>
+                <a:effectLst/>
+              </a:rPr>
+              <a:t>-extension-server</a:t>
+            </a:r>
+            <a:br>
+              <a:rPr lang="en-US" sz="1600" dirty="0">
+                <a:solidFill>
+                  <a:srgbClr val="A9B7C6"/>
+                </a:solidFill>
+                <a:effectLst/>
+              </a:rPr>
+            </a:br>
+            <a:r>
+              <a:rPr lang="en-US" sz="1600" dirty="0">
+                <a:solidFill>
+                  <a:srgbClr val="A9B7C6"/>
+                </a:solidFill>
+                <a:effectLst/>
+              </a:rPr>
+              <a:t>    </a:t>
+            </a:r>
+            <a:r>
+              <a:rPr lang="en-US" sz="1600" dirty="0">
+                <a:solidFill>
+                  <a:srgbClr val="CC7832"/>
+                </a:solidFill>
+                <a:effectLst/>
+              </a:rPr>
+              <a:t>namespace</a:t>
+            </a:r>
+            <a:r>
+              <a:rPr lang="en-US" sz="1600" dirty="0">
+                <a:solidFill>
+                  <a:srgbClr val="A9B7C6"/>
+                </a:solidFill>
+                <a:effectLst/>
+              </a:rPr>
+              <a:t>: default</a:t>
+            </a:r>
+            <a:br>
+              <a:rPr lang="en-US" sz="1600" dirty="0">
+                <a:solidFill>
+                  <a:srgbClr val="A9B7C6"/>
+                </a:solidFill>
+                <a:effectLst/>
+              </a:rPr>
+            </a:br>
+            <a:r>
+              <a:rPr lang="en-US" sz="1600" dirty="0">
+                <a:solidFill>
+                  <a:srgbClr val="A9B7C6"/>
+                </a:solidFill>
+                <a:effectLst/>
+              </a:rPr>
+              <a:t>  </a:t>
+            </a:r>
+            <a:r>
+              <a:rPr lang="en-US" sz="1600" dirty="0">
+                <a:solidFill>
+                  <a:srgbClr val="CC7832"/>
+                </a:solidFill>
+                <a:effectLst/>
+              </a:rPr>
+              <a:t>group</a:t>
+            </a:r>
+            <a:r>
+              <a:rPr lang="en-US" sz="1600" dirty="0">
+                <a:solidFill>
+                  <a:srgbClr val="A9B7C6"/>
+                </a:solidFill>
+                <a:effectLst/>
+              </a:rPr>
+              <a:t>: </a:t>
+            </a:r>
+            <a:r>
+              <a:rPr lang="en-US" sz="1600" dirty="0" err="1">
+                <a:solidFill>
+                  <a:srgbClr val="A9B7C6"/>
+                </a:solidFill>
+                <a:effectLst/>
+              </a:rPr>
+              <a:t>example.com</a:t>
+            </a:r>
+            <a:br>
+              <a:rPr lang="en-US" sz="1600" dirty="0">
+                <a:solidFill>
+                  <a:srgbClr val="A9B7C6"/>
+                </a:solidFill>
+                <a:effectLst/>
+              </a:rPr>
+            </a:br>
+            <a:r>
+              <a:rPr lang="en-US" sz="1600" dirty="0">
+                <a:solidFill>
+                  <a:srgbClr val="A9B7C6"/>
+                </a:solidFill>
+                <a:effectLst/>
+              </a:rPr>
+              <a:t>  </a:t>
+            </a:r>
+            <a:r>
+              <a:rPr lang="en-US" sz="1600" dirty="0">
+                <a:solidFill>
+                  <a:srgbClr val="CC7832"/>
+                </a:solidFill>
+                <a:effectLst/>
+              </a:rPr>
+              <a:t>version</a:t>
+            </a:r>
+            <a:r>
+              <a:rPr lang="en-US" sz="1600" dirty="0">
+                <a:solidFill>
+                  <a:srgbClr val="A9B7C6"/>
+                </a:solidFill>
+                <a:effectLst/>
+              </a:rPr>
+              <a:t>: v1alpha1</a:t>
+            </a:r>
+            <a:br>
+              <a:rPr lang="en-US" sz="1600" dirty="0">
+                <a:solidFill>
+                  <a:srgbClr val="A9B7C6"/>
+                </a:solidFill>
+                <a:effectLst/>
+              </a:rPr>
+            </a:br>
+            <a:r>
+              <a:rPr lang="en-US" sz="1600" dirty="0">
+                <a:solidFill>
+                  <a:srgbClr val="A9B7C6"/>
+                </a:solidFill>
+                <a:effectLst/>
+              </a:rPr>
+              <a:t>  </a:t>
+            </a:r>
+            <a:r>
+              <a:rPr lang="en-US" sz="1600" dirty="0" err="1">
+                <a:solidFill>
+                  <a:srgbClr val="CC7832"/>
+                </a:solidFill>
+                <a:effectLst/>
+              </a:rPr>
+              <a:t>insecureSkipTLSVerify</a:t>
+            </a:r>
+            <a:r>
+              <a:rPr lang="en-US" sz="1600" dirty="0">
+                <a:solidFill>
+                  <a:srgbClr val="A9B7C6"/>
+                </a:solidFill>
+                <a:effectLst/>
+              </a:rPr>
+              <a:t>: true</a:t>
+            </a:r>
+            <a:br>
+              <a:rPr lang="en-US" sz="1600" dirty="0">
+                <a:solidFill>
+                  <a:srgbClr val="A9B7C6"/>
+                </a:solidFill>
+                <a:effectLst/>
+              </a:rPr>
+            </a:br>
+            <a:r>
+              <a:rPr lang="en-US" sz="1600" dirty="0">
+                <a:solidFill>
+                  <a:srgbClr val="A9B7C6"/>
+                </a:solidFill>
+                <a:effectLst/>
+              </a:rPr>
+              <a:t>  </a:t>
+            </a:r>
+            <a:r>
+              <a:rPr lang="en-US" sz="1600" dirty="0" err="1">
+                <a:solidFill>
+                  <a:srgbClr val="CC7832"/>
+                </a:solidFill>
+                <a:effectLst/>
+              </a:rPr>
+              <a:t>groupPriorityMinimum</a:t>
+            </a:r>
+            <a:r>
+              <a:rPr lang="en-US" sz="1600" dirty="0">
+                <a:solidFill>
+                  <a:srgbClr val="A9B7C6"/>
+                </a:solidFill>
+                <a:effectLst/>
+              </a:rPr>
+              <a:t>: 1000 </a:t>
+            </a:r>
+            <a:r>
+              <a:rPr lang="en-US" sz="1600" i="1" dirty="0">
+                <a:solidFill>
+                  <a:srgbClr val="629755"/>
+                </a:solidFill>
+                <a:effectLst/>
+              </a:rPr>
+              <a:t># Kubernetes uses this to resolve conflicts when multiple API groups serve the same resource. A higher value means higher priority.</a:t>
+            </a:r>
+            <a:br>
+              <a:rPr lang="en-US" sz="1600" i="1" dirty="0">
+                <a:solidFill>
+                  <a:srgbClr val="629755"/>
+                </a:solidFill>
+                <a:effectLst/>
+              </a:rPr>
+            </a:br>
+            <a:r>
+              <a:rPr lang="en-US" sz="1600" i="1" dirty="0">
+                <a:solidFill>
+                  <a:srgbClr val="629755"/>
+                </a:solidFill>
+                <a:effectLst/>
+              </a:rPr>
+              <a:t>  </a:t>
+            </a:r>
+            <a:r>
+              <a:rPr lang="en-US" sz="1600" dirty="0" err="1">
+                <a:solidFill>
+                  <a:srgbClr val="CC7832"/>
+                </a:solidFill>
+                <a:effectLst/>
+              </a:rPr>
+              <a:t>versionPriority</a:t>
+            </a:r>
+            <a:r>
+              <a:rPr lang="en-US" sz="1600" dirty="0">
+                <a:solidFill>
+                  <a:srgbClr val="A9B7C6"/>
+                </a:solidFill>
+                <a:effectLst/>
+              </a:rPr>
+              <a:t>: 15</a:t>
+            </a:r>
+          </a:p>
+          <a:p>
+            <a:endParaRPr lang="en-US" sz="1600" dirty="0">
+              <a:effectLst/>
+            </a:endParaRPr>
+          </a:p>
+        </p:txBody>
+      </p:sp>
+    </p:spTree>
+    <p:custDataLst>
+      <p:tags r:id="rId1"/>
+    </p:custDataLst>
+    <p:extLst>
+      <p:ext uri="{BB962C8B-B14F-4D97-AF65-F5344CB8AC3E}">
+        <p14:creationId xmlns:p14="http://schemas.microsoft.com/office/powerpoint/2010/main" val="3201004893"/>
       </p:ext>
     </p:extLst>
   </p:cSld>
@@ -11611,6 +13903,24 @@
 </file>
 
 <file path=ppt/tags/tag1.xml><?xml version="1.0" encoding="utf-8"?>
+<p:tagLst xmlns:a="http://schemas.openxmlformats.org/drawingml/2006/main" xmlns:r="http://schemas.openxmlformats.org/officeDocument/2006/relationships" xmlns:p="http://schemas.openxmlformats.org/presentationml/2006/main">
+  <p:tag name="TIMING" val="|16.9|24.2|0"/>
+</p:tagLst>
+</file>
+
+<file path=ppt/tags/tag10.xml><?xml version="1.0" encoding="utf-8"?>
+<p:tagLst xmlns:a="http://schemas.openxmlformats.org/drawingml/2006/main" xmlns:r="http://schemas.openxmlformats.org/officeDocument/2006/relationships" xmlns:p="http://schemas.openxmlformats.org/presentationml/2006/main">
+  <p:tag name="TIMING" val="|16.9|24.2|0"/>
+</p:tagLst>
+</file>
+
+<file path=ppt/tags/tag11.xml><?xml version="1.0" encoding="utf-8"?>
+<p:tagLst xmlns:a="http://schemas.openxmlformats.org/drawingml/2006/main" xmlns:r="http://schemas.openxmlformats.org/officeDocument/2006/relationships" xmlns:p="http://schemas.openxmlformats.org/presentationml/2006/main">
+  <p:tag name="TIMING" val="|16.9|24.2|0"/>
+</p:tagLst>
+</file>
+
+<file path=ppt/tags/tag12.xml><?xml version="1.0" encoding="utf-8"?>
 <p:tagLst xmlns:a="http://schemas.openxmlformats.org/drawingml/2006/main" xmlns:r="http://schemas.openxmlformats.org/officeDocument/2006/relationships" xmlns:p="http://schemas.openxmlformats.org/presentationml/2006/main">
   <p:tag name="TIMING" val="|16.9|24.2|0"/>
 </p:tagLst>
@@ -11647,6 +13957,18 @@
 </file>
 
 <file path=ppt/tags/tag7.xml><?xml version="1.0" encoding="utf-8"?>
+<p:tagLst xmlns:a="http://schemas.openxmlformats.org/drawingml/2006/main" xmlns:r="http://schemas.openxmlformats.org/officeDocument/2006/relationships" xmlns:p="http://schemas.openxmlformats.org/presentationml/2006/main">
+  <p:tag name="TIMING" val="|16.9|24.2|0"/>
+</p:tagLst>
+</file>
+
+<file path=ppt/tags/tag8.xml><?xml version="1.0" encoding="utf-8"?>
+<p:tagLst xmlns:a="http://schemas.openxmlformats.org/drawingml/2006/main" xmlns:r="http://schemas.openxmlformats.org/officeDocument/2006/relationships" xmlns:p="http://schemas.openxmlformats.org/presentationml/2006/main">
+  <p:tag name="TIMING" val="|16.9|24.2|0"/>
+</p:tagLst>
+</file>
+
+<file path=ppt/tags/tag9.xml><?xml version="1.0" encoding="utf-8"?>
 <p:tagLst xmlns:a="http://schemas.openxmlformats.org/drawingml/2006/main" xmlns:r="http://schemas.openxmlformats.org/officeDocument/2006/relationships" xmlns:p="http://schemas.openxmlformats.org/presentationml/2006/main">
   <p:tag name="TIMING" val="|16.9|24.2|0"/>
 </p:tagLst>
@@ -12470,18 +14792,18 @@
 </file>
 
 <file path=customXml/item1.xml><?xml version="1.0" encoding="utf-8"?>
-<p:properties xmlns:p="http://schemas.microsoft.com/office/2006/metadata/properties" xmlns:xsi="http://www.w3.org/2001/XMLSchema-instance" xmlns:pc="http://schemas.microsoft.com/office/infopath/2007/PartnerControls">
-  <documentManagement/>
-</p:properties>
-</file>
-
-<file path=customXml/item2.xml><?xml version="1.0" encoding="utf-8"?>
 <?mso-contentType ?>
 <FormTemplates xmlns="http://schemas.microsoft.com/sharepoint/v3/contenttype/forms">
   <Display>DocumentLibraryForm</Display>
   <Edit>DocumentLibraryForm</Edit>
   <New>DocumentLibraryForm</New>
 </FormTemplates>
+</file>
+
+<file path=customXml/item2.xml><?xml version="1.0" encoding="utf-8"?>
+<p:properties xmlns:p="http://schemas.microsoft.com/office/2006/metadata/properties" xmlns:xsi="http://www.w3.org/2001/XMLSchema-instance" xmlns:pc="http://schemas.microsoft.com/office/infopath/2007/PartnerControls">
+  <documentManagement/>
+</p:properties>
 </file>
 
 <file path=customXml/item3.xml><?xml version="1.0" encoding="utf-8"?>
@@ -12617,6 +14939,14 @@
 </file>
 
 <file path=customXml/itemProps1.xml><?xml version="1.0" encoding="utf-8"?>
+<ds:datastoreItem xmlns:ds="http://schemas.openxmlformats.org/officeDocument/2006/customXml" ds:itemID="{D5F8D509-23D9-4C54-AF87-293BA1A6052D}">
+  <ds:schemaRefs>
+    <ds:schemaRef ds:uri="http://schemas.microsoft.com/sharepoint/v3/contenttype/forms"/>
+  </ds:schemaRefs>
+</ds:datastoreItem>
+</file>
+
+<file path=customXml/itemProps2.xml><?xml version="1.0" encoding="utf-8"?>
 <ds:datastoreItem xmlns:ds="http://schemas.openxmlformats.org/officeDocument/2006/customXml" ds:itemID="{5B04C1A0-A675-4C19-A396-213721E544B7}">
   <ds:schemaRefs>
     <ds:schemaRef ds:uri="http://schemas.microsoft.com/office/2006/metadata/properties"/>
@@ -12628,14 +14958,6 @@
     <ds:schemaRef ds:uri="http://schemas.microsoft.com/office/infopath/2007/PartnerControls"/>
     <ds:schemaRef ds:uri="http://schemas.openxmlformats.org/package/2006/metadata/core-properties"/>
     <ds:schemaRef ds:uri="http://purl.org/dc/dcmitype/"/>
-  </ds:schemaRefs>
-</ds:datastoreItem>
-</file>
-
-<file path=customXml/itemProps2.xml><?xml version="1.0" encoding="utf-8"?>
-<ds:datastoreItem xmlns:ds="http://schemas.openxmlformats.org/officeDocument/2006/customXml" ds:itemID="{D5F8D509-23D9-4C54-AF87-293BA1A6052D}">
-  <ds:schemaRefs>
-    <ds:schemaRef ds:uri="http://schemas.microsoft.com/sharepoint/v3/contenttype/forms"/>
   </ds:schemaRefs>
 </ds:datastoreItem>
 </file>

</xml_diff>